<commit_message>
Started updating for OHDSI Europe 2024
</commit_message>
<xml_diff>
--- a/slides/HADESIntro.pptx
+++ b/slides/HADESIntro.pptx
@@ -5,38 +5,39 @@
     <p:sldMasterId id="2147483648" r:id="rId1"/>
   </p:sldMasterIdLst>
   <p:notesMasterIdLst>
-    <p:notesMasterId r:id="rId31"/>
+    <p:notesMasterId r:id="rId32"/>
   </p:notesMasterIdLst>
   <p:sldIdLst>
     <p:sldId id="256" r:id="rId2"/>
     <p:sldId id="15368039" r:id="rId3"/>
     <p:sldId id="285" r:id="rId4"/>
     <p:sldId id="286" r:id="rId5"/>
-    <p:sldId id="257" r:id="rId6"/>
-    <p:sldId id="287" r:id="rId7"/>
-    <p:sldId id="288" r:id="rId8"/>
-    <p:sldId id="289" r:id="rId9"/>
-    <p:sldId id="290" r:id="rId10"/>
-    <p:sldId id="300" r:id="rId11"/>
-    <p:sldId id="378" r:id="rId12"/>
-    <p:sldId id="380" r:id="rId13"/>
-    <p:sldId id="381" r:id="rId14"/>
-    <p:sldId id="382" r:id="rId15"/>
-    <p:sldId id="384" r:id="rId16"/>
-    <p:sldId id="385" r:id="rId17"/>
-    <p:sldId id="267" r:id="rId18"/>
-    <p:sldId id="269" r:id="rId19"/>
-    <p:sldId id="271" r:id="rId20"/>
-    <p:sldId id="305" r:id="rId21"/>
-    <p:sldId id="15368034" r:id="rId22"/>
-    <p:sldId id="395" r:id="rId23"/>
-    <p:sldId id="387" r:id="rId24"/>
-    <p:sldId id="389" r:id="rId25"/>
-    <p:sldId id="15368035" r:id="rId26"/>
-    <p:sldId id="15368036" r:id="rId27"/>
-    <p:sldId id="15368038" r:id="rId28"/>
-    <p:sldId id="15368033" r:id="rId29"/>
-    <p:sldId id="291" r:id="rId30"/>
+    <p:sldId id="15368040" r:id="rId6"/>
+    <p:sldId id="257" r:id="rId7"/>
+    <p:sldId id="287" r:id="rId8"/>
+    <p:sldId id="288" r:id="rId9"/>
+    <p:sldId id="289" r:id="rId10"/>
+    <p:sldId id="290" r:id="rId11"/>
+    <p:sldId id="300" r:id="rId12"/>
+    <p:sldId id="378" r:id="rId13"/>
+    <p:sldId id="380" r:id="rId14"/>
+    <p:sldId id="381" r:id="rId15"/>
+    <p:sldId id="382" r:id="rId16"/>
+    <p:sldId id="384" r:id="rId17"/>
+    <p:sldId id="385" r:id="rId18"/>
+    <p:sldId id="267" r:id="rId19"/>
+    <p:sldId id="269" r:id="rId20"/>
+    <p:sldId id="271" r:id="rId21"/>
+    <p:sldId id="305" r:id="rId22"/>
+    <p:sldId id="15368034" r:id="rId23"/>
+    <p:sldId id="395" r:id="rId24"/>
+    <p:sldId id="387" r:id="rId25"/>
+    <p:sldId id="389" r:id="rId26"/>
+    <p:sldId id="15368035" r:id="rId27"/>
+    <p:sldId id="15368036" r:id="rId28"/>
+    <p:sldId id="15368038" r:id="rId29"/>
+    <p:sldId id="15368033" r:id="rId30"/>
+    <p:sldId id="291" r:id="rId31"/>
   </p:sldIdLst>
   <p:sldSz cx="12192000" cy="6858000"/>
   <p:notesSz cx="6858000" cy="9144000"/>
@@ -1134,6 +1135,204 @@
     </pc:docChg>
   </pc:docChgLst>
   <pc:docChgLst>
+    <pc:chgData name="Schuemie, Martijn [JRDNL]" userId="af052a53-8e28-4f8f-bcc1-00b76bd98f4e" providerId="ADAL" clId="{9CEB1C98-947C-4865-B7E4-26250F9D02CE}"/>
+    <pc:docChg chg="custSel addSld delSld modSld">
+      <pc:chgData name="Schuemie, Martijn [JRDNL]" userId="af052a53-8e28-4f8f-bcc1-00b76bd98f4e" providerId="ADAL" clId="{9CEB1C98-947C-4865-B7E4-26250F9D02CE}" dt="2023-03-16T08:24:58.589" v="1743" actId="20577"/>
+      <pc:docMkLst>
+        <pc:docMk/>
+      </pc:docMkLst>
+      <pc:sldChg chg="modSp mod">
+        <pc:chgData name="Schuemie, Martijn [JRDNL]" userId="af052a53-8e28-4f8f-bcc1-00b76bd98f4e" providerId="ADAL" clId="{9CEB1C98-947C-4865-B7E4-26250F9D02CE}" dt="2023-03-16T07:44:11.464" v="71" actId="20577"/>
+        <pc:sldMkLst>
+          <pc:docMk/>
+          <pc:sldMk cId="1178132217" sldId="258"/>
+        </pc:sldMkLst>
+        <pc:spChg chg="mod">
+          <ac:chgData name="Schuemie, Martijn [JRDNL]" userId="af052a53-8e28-4f8f-bcc1-00b76bd98f4e" providerId="ADAL" clId="{9CEB1C98-947C-4865-B7E4-26250F9D02CE}" dt="2023-03-16T07:44:11.464" v="71" actId="20577"/>
+          <ac:spMkLst>
+            <pc:docMk/>
+            <pc:sldMk cId="1178132217" sldId="258"/>
+            <ac:spMk id="3" creationId="{5086A014-51FB-5065-DABA-18EE95296EF2}"/>
+          </ac:spMkLst>
+        </pc:spChg>
+      </pc:sldChg>
+      <pc:sldChg chg="modSp modAnim">
+        <pc:chgData name="Schuemie, Martijn [JRDNL]" userId="af052a53-8e28-4f8f-bcc1-00b76bd98f4e" providerId="ADAL" clId="{9CEB1C98-947C-4865-B7E4-26250F9D02CE}" dt="2023-03-16T07:46:14.945" v="179" actId="20577"/>
+        <pc:sldMkLst>
+          <pc:docMk/>
+          <pc:sldMk cId="214038350" sldId="260"/>
+        </pc:sldMkLst>
+        <pc:spChg chg="mod">
+          <ac:chgData name="Schuemie, Martijn [JRDNL]" userId="af052a53-8e28-4f8f-bcc1-00b76bd98f4e" providerId="ADAL" clId="{9CEB1C98-947C-4865-B7E4-26250F9D02CE}" dt="2023-03-16T07:46:14.945" v="179" actId="20577"/>
+          <ac:spMkLst>
+            <pc:docMk/>
+            <pc:sldMk cId="214038350" sldId="260"/>
+            <ac:spMk id="3" creationId="{E6DDA322-6444-733D-E75E-B015139B6938}"/>
+          </ac:spMkLst>
+        </pc:spChg>
+      </pc:sldChg>
+      <pc:sldChg chg="modSp mod modAnim">
+        <pc:chgData name="Schuemie, Martijn [JRDNL]" userId="af052a53-8e28-4f8f-bcc1-00b76bd98f4e" providerId="ADAL" clId="{9CEB1C98-947C-4865-B7E4-26250F9D02CE}" dt="2023-03-16T08:16:21.907" v="1722" actId="27636"/>
+        <pc:sldMkLst>
+          <pc:docMk/>
+          <pc:sldMk cId="3695007226" sldId="261"/>
+        </pc:sldMkLst>
+        <pc:spChg chg="mod">
+          <ac:chgData name="Schuemie, Martijn [JRDNL]" userId="af052a53-8e28-4f8f-bcc1-00b76bd98f4e" providerId="ADAL" clId="{9CEB1C98-947C-4865-B7E4-26250F9D02CE}" dt="2023-03-16T08:16:21.907" v="1722" actId="27636"/>
+          <ac:spMkLst>
+            <pc:docMk/>
+            <pc:sldMk cId="3695007226" sldId="261"/>
+            <ac:spMk id="3" creationId="{6BFE6916-8286-8840-92FC-34C1C4493299}"/>
+          </ac:spMkLst>
+        </pc:spChg>
+      </pc:sldChg>
+      <pc:sldChg chg="del">
+        <pc:chgData name="Schuemie, Martijn [JRDNL]" userId="af052a53-8e28-4f8f-bcc1-00b76bd98f4e" providerId="ADAL" clId="{9CEB1C98-947C-4865-B7E4-26250F9D02CE}" dt="2023-03-16T07:47:52.244" v="463" actId="47"/>
+        <pc:sldMkLst>
+          <pc:docMk/>
+          <pc:sldMk cId="865780318" sldId="263"/>
+        </pc:sldMkLst>
+      </pc:sldChg>
+      <pc:sldChg chg="modSp new mod">
+        <pc:chgData name="Schuemie, Martijn [JRDNL]" userId="af052a53-8e28-4f8f-bcc1-00b76bd98f4e" providerId="ADAL" clId="{9CEB1C98-947C-4865-B7E4-26250F9D02CE}" dt="2023-03-16T07:57:02.560" v="707" actId="20577"/>
+        <pc:sldMkLst>
+          <pc:docMk/>
+          <pc:sldMk cId="3245620795" sldId="263"/>
+        </pc:sldMkLst>
+        <pc:spChg chg="mod">
+          <ac:chgData name="Schuemie, Martijn [JRDNL]" userId="af052a53-8e28-4f8f-bcc1-00b76bd98f4e" providerId="ADAL" clId="{9CEB1C98-947C-4865-B7E4-26250F9D02CE}" dt="2023-03-16T07:48:02.983" v="483" actId="20577"/>
+          <ac:spMkLst>
+            <pc:docMk/>
+            <pc:sldMk cId="3245620795" sldId="263"/>
+            <ac:spMk id="2" creationId="{D3A807A4-DC51-F5E0-3D6B-119D11E0384E}"/>
+          </ac:spMkLst>
+        </pc:spChg>
+        <pc:spChg chg="mod">
+          <ac:chgData name="Schuemie, Martijn [JRDNL]" userId="af052a53-8e28-4f8f-bcc1-00b76bd98f4e" providerId="ADAL" clId="{9CEB1C98-947C-4865-B7E4-26250F9D02CE}" dt="2023-03-16T07:57:02.560" v="707" actId="20577"/>
+          <ac:spMkLst>
+            <pc:docMk/>
+            <pc:sldMk cId="3245620795" sldId="263"/>
+            <ac:spMk id="3" creationId="{AF8B8E43-0C37-CE7A-5F8E-9DEAD6117FF0}"/>
+          </ac:spMkLst>
+        </pc:spChg>
+      </pc:sldChg>
+      <pc:sldChg chg="modSp new mod">
+        <pc:chgData name="Schuemie, Martijn [JRDNL]" userId="af052a53-8e28-4f8f-bcc1-00b76bd98f4e" providerId="ADAL" clId="{9CEB1C98-947C-4865-B7E4-26250F9D02CE}" dt="2023-03-16T08:06:06.290" v="790" actId="5793"/>
+        <pc:sldMkLst>
+          <pc:docMk/>
+          <pc:sldMk cId="1627552034" sldId="264"/>
+        </pc:sldMkLst>
+        <pc:spChg chg="mod">
+          <ac:chgData name="Schuemie, Martijn [JRDNL]" userId="af052a53-8e28-4f8f-bcc1-00b76bd98f4e" providerId="ADAL" clId="{9CEB1C98-947C-4865-B7E4-26250F9D02CE}" dt="2023-03-16T08:03:06.936" v="709"/>
+          <ac:spMkLst>
+            <pc:docMk/>
+            <pc:sldMk cId="1627552034" sldId="264"/>
+            <ac:spMk id="2" creationId="{6810BD4C-FDEC-31E9-74E4-872EA446D64C}"/>
+          </ac:spMkLst>
+        </pc:spChg>
+        <pc:spChg chg="mod">
+          <ac:chgData name="Schuemie, Martijn [JRDNL]" userId="af052a53-8e28-4f8f-bcc1-00b76bd98f4e" providerId="ADAL" clId="{9CEB1C98-947C-4865-B7E4-26250F9D02CE}" dt="2023-03-16T08:06:06.290" v="790" actId="5793"/>
+          <ac:spMkLst>
+            <pc:docMk/>
+            <pc:sldMk cId="1627552034" sldId="264"/>
+            <ac:spMk id="3" creationId="{5C6E4513-2D93-8B15-7C58-F90D8B2D540A}"/>
+          </ac:spMkLst>
+        </pc:spChg>
+      </pc:sldChg>
+      <pc:sldChg chg="modSp new mod">
+        <pc:chgData name="Schuemie, Martijn [JRDNL]" userId="af052a53-8e28-4f8f-bcc1-00b76bd98f4e" providerId="ADAL" clId="{9CEB1C98-947C-4865-B7E4-26250F9D02CE}" dt="2023-03-16T08:09:32.700" v="1132" actId="20577"/>
+        <pc:sldMkLst>
+          <pc:docMk/>
+          <pc:sldMk cId="387441409" sldId="265"/>
+        </pc:sldMkLst>
+        <pc:spChg chg="mod">
+          <ac:chgData name="Schuemie, Martijn [JRDNL]" userId="af052a53-8e28-4f8f-bcc1-00b76bd98f4e" providerId="ADAL" clId="{9CEB1C98-947C-4865-B7E4-26250F9D02CE}" dt="2023-03-16T08:06:27.896" v="792"/>
+          <ac:spMkLst>
+            <pc:docMk/>
+            <pc:sldMk cId="387441409" sldId="265"/>
+            <ac:spMk id="2" creationId="{78A1AE87-F4B1-E413-1DBD-3C480581EB42}"/>
+          </ac:spMkLst>
+        </pc:spChg>
+        <pc:spChg chg="mod">
+          <ac:chgData name="Schuemie, Martijn [JRDNL]" userId="af052a53-8e28-4f8f-bcc1-00b76bd98f4e" providerId="ADAL" clId="{9CEB1C98-947C-4865-B7E4-26250F9D02CE}" dt="2023-03-16T08:09:32.700" v="1132" actId="20577"/>
+          <ac:spMkLst>
+            <pc:docMk/>
+            <pc:sldMk cId="387441409" sldId="265"/>
+            <ac:spMk id="3" creationId="{FAAC0FEE-111C-0BF3-21F6-1B6EC54BD703}"/>
+          </ac:spMkLst>
+        </pc:spChg>
+      </pc:sldChg>
+      <pc:sldChg chg="modSp new mod">
+        <pc:chgData name="Schuemie, Martijn [JRDNL]" userId="af052a53-8e28-4f8f-bcc1-00b76bd98f4e" providerId="ADAL" clId="{9CEB1C98-947C-4865-B7E4-26250F9D02CE}" dt="2023-03-16T08:12:08.059" v="1442"/>
+        <pc:sldMkLst>
+          <pc:docMk/>
+          <pc:sldMk cId="3419704005" sldId="266"/>
+        </pc:sldMkLst>
+        <pc:spChg chg="mod">
+          <ac:chgData name="Schuemie, Martijn [JRDNL]" userId="af052a53-8e28-4f8f-bcc1-00b76bd98f4e" providerId="ADAL" clId="{9CEB1C98-947C-4865-B7E4-26250F9D02CE}" dt="2023-03-16T08:10:34.357" v="1194" actId="20577"/>
+          <ac:spMkLst>
+            <pc:docMk/>
+            <pc:sldMk cId="3419704005" sldId="266"/>
+            <ac:spMk id="2" creationId="{8B8571E8-F670-C062-D66F-165815A8874D}"/>
+          </ac:spMkLst>
+        </pc:spChg>
+        <pc:spChg chg="mod">
+          <ac:chgData name="Schuemie, Martijn [JRDNL]" userId="af052a53-8e28-4f8f-bcc1-00b76bd98f4e" providerId="ADAL" clId="{9CEB1C98-947C-4865-B7E4-26250F9D02CE}" dt="2023-03-16T08:12:08.059" v="1442"/>
+          <ac:spMkLst>
+            <pc:docMk/>
+            <pc:sldMk cId="3419704005" sldId="266"/>
+            <ac:spMk id="3" creationId="{4F139CC0-DBEF-E4A3-1378-8A36C29D0C0F}"/>
+          </ac:spMkLst>
+        </pc:spChg>
+      </pc:sldChg>
+      <pc:sldChg chg="modSp new mod">
+        <pc:chgData name="Schuemie, Martijn [JRDNL]" userId="af052a53-8e28-4f8f-bcc1-00b76bd98f4e" providerId="ADAL" clId="{9CEB1C98-947C-4865-B7E4-26250F9D02CE}" dt="2023-03-16T08:15:35.057" v="1661" actId="20577"/>
+        <pc:sldMkLst>
+          <pc:docMk/>
+          <pc:sldMk cId="1216664922" sldId="267"/>
+        </pc:sldMkLst>
+        <pc:spChg chg="mod">
+          <ac:chgData name="Schuemie, Martijn [JRDNL]" userId="af052a53-8e28-4f8f-bcc1-00b76bd98f4e" providerId="ADAL" clId="{9CEB1C98-947C-4865-B7E4-26250F9D02CE}" dt="2023-03-16T08:13:15.524" v="1492" actId="20577"/>
+          <ac:spMkLst>
+            <pc:docMk/>
+            <pc:sldMk cId="1216664922" sldId="267"/>
+            <ac:spMk id="2" creationId="{E92F4414-A0DB-B547-01E6-7053578E0779}"/>
+          </ac:spMkLst>
+        </pc:spChg>
+        <pc:spChg chg="mod">
+          <ac:chgData name="Schuemie, Martijn [JRDNL]" userId="af052a53-8e28-4f8f-bcc1-00b76bd98f4e" providerId="ADAL" clId="{9CEB1C98-947C-4865-B7E4-26250F9D02CE}" dt="2023-03-16T08:15:35.057" v="1661" actId="20577"/>
+          <ac:spMkLst>
+            <pc:docMk/>
+            <pc:sldMk cId="1216664922" sldId="267"/>
+            <ac:spMk id="3" creationId="{C11BC3E1-EC5C-6952-3D5C-4CB6EE6158E0}"/>
+          </ac:spMkLst>
+        </pc:spChg>
+      </pc:sldChg>
+      <pc:sldChg chg="new del">
+        <pc:chgData name="Schuemie, Martijn [JRDNL]" userId="af052a53-8e28-4f8f-bcc1-00b76bd98f4e" providerId="ADAL" clId="{9CEB1C98-947C-4865-B7E4-26250F9D02CE}" dt="2023-03-16T08:13:06.246" v="1475" actId="47"/>
+        <pc:sldMkLst>
+          <pc:docMk/>
+          <pc:sldMk cId="2903604858" sldId="267"/>
+        </pc:sldMkLst>
+      </pc:sldChg>
+      <pc:sldChg chg="modSp new mod">
+        <pc:chgData name="Schuemie, Martijn [JRDNL]" userId="af052a53-8e28-4f8f-bcc1-00b76bd98f4e" providerId="ADAL" clId="{9CEB1C98-947C-4865-B7E4-26250F9D02CE}" dt="2023-03-16T08:24:58.589" v="1743" actId="20577"/>
+        <pc:sldMkLst>
+          <pc:docMk/>
+          <pc:sldMk cId="882376883" sldId="268"/>
+        </pc:sldMkLst>
+        <pc:spChg chg="mod">
+          <ac:chgData name="Schuemie, Martijn [JRDNL]" userId="af052a53-8e28-4f8f-bcc1-00b76bd98f4e" providerId="ADAL" clId="{9CEB1C98-947C-4865-B7E4-26250F9D02CE}" dt="2023-03-16T08:24:58.589" v="1743" actId="20577"/>
+          <ac:spMkLst>
+            <pc:docMk/>
+            <pc:sldMk cId="882376883" sldId="268"/>
+            <ac:spMk id="2" creationId="{5079BF75-D24C-7696-93E8-52BEFA2AC599}"/>
+          </ac:spMkLst>
+        </pc:spChg>
+      </pc:sldChg>
+    </pc:docChg>
+  </pc:docChgLst>
+  <pc:docChgLst>
     <pc:chgData name="Schuemie, Martijn [JRDNL]" userId="af052a53-8e28-4f8f-bcc1-00b76bd98f4e" providerId="ADAL" clId="{02F96C0D-5614-448C-B1E2-D7B920647732}"/>
     <pc:docChg chg="custSel addSld delSld modSld sldOrd">
       <pc:chgData name="Schuemie, Martijn [JRDNL]" userId="af052a53-8e28-4f8f-bcc1-00b76bd98f4e" providerId="ADAL" clId="{02F96C0D-5614-448C-B1E2-D7B920647732}" dt="2023-05-18T13:55:13.080" v="1519" actId="20577"/>
@@ -1356,204 +1555,6 @@
             <pc:docMk/>
             <pc:sldMk cId="1526744979" sldId="275"/>
             <ac:spMk id="3" creationId="{A445AD0E-5998-EDAF-F1C1-35682B30583A}"/>
-          </ac:spMkLst>
-        </pc:spChg>
-      </pc:sldChg>
-    </pc:docChg>
-  </pc:docChgLst>
-  <pc:docChgLst>
-    <pc:chgData name="Schuemie, Martijn [JRDNL]" userId="af052a53-8e28-4f8f-bcc1-00b76bd98f4e" providerId="ADAL" clId="{9CEB1C98-947C-4865-B7E4-26250F9D02CE}"/>
-    <pc:docChg chg="custSel addSld delSld modSld">
-      <pc:chgData name="Schuemie, Martijn [JRDNL]" userId="af052a53-8e28-4f8f-bcc1-00b76bd98f4e" providerId="ADAL" clId="{9CEB1C98-947C-4865-B7E4-26250F9D02CE}" dt="2023-03-16T08:24:58.589" v="1743" actId="20577"/>
-      <pc:docMkLst>
-        <pc:docMk/>
-      </pc:docMkLst>
-      <pc:sldChg chg="modSp mod">
-        <pc:chgData name="Schuemie, Martijn [JRDNL]" userId="af052a53-8e28-4f8f-bcc1-00b76bd98f4e" providerId="ADAL" clId="{9CEB1C98-947C-4865-B7E4-26250F9D02CE}" dt="2023-03-16T07:44:11.464" v="71" actId="20577"/>
-        <pc:sldMkLst>
-          <pc:docMk/>
-          <pc:sldMk cId="1178132217" sldId="258"/>
-        </pc:sldMkLst>
-        <pc:spChg chg="mod">
-          <ac:chgData name="Schuemie, Martijn [JRDNL]" userId="af052a53-8e28-4f8f-bcc1-00b76bd98f4e" providerId="ADAL" clId="{9CEB1C98-947C-4865-B7E4-26250F9D02CE}" dt="2023-03-16T07:44:11.464" v="71" actId="20577"/>
-          <ac:spMkLst>
-            <pc:docMk/>
-            <pc:sldMk cId="1178132217" sldId="258"/>
-            <ac:spMk id="3" creationId="{5086A014-51FB-5065-DABA-18EE95296EF2}"/>
-          </ac:spMkLst>
-        </pc:spChg>
-      </pc:sldChg>
-      <pc:sldChg chg="modSp modAnim">
-        <pc:chgData name="Schuemie, Martijn [JRDNL]" userId="af052a53-8e28-4f8f-bcc1-00b76bd98f4e" providerId="ADAL" clId="{9CEB1C98-947C-4865-B7E4-26250F9D02CE}" dt="2023-03-16T07:46:14.945" v="179" actId="20577"/>
-        <pc:sldMkLst>
-          <pc:docMk/>
-          <pc:sldMk cId="214038350" sldId="260"/>
-        </pc:sldMkLst>
-        <pc:spChg chg="mod">
-          <ac:chgData name="Schuemie, Martijn [JRDNL]" userId="af052a53-8e28-4f8f-bcc1-00b76bd98f4e" providerId="ADAL" clId="{9CEB1C98-947C-4865-B7E4-26250F9D02CE}" dt="2023-03-16T07:46:14.945" v="179" actId="20577"/>
-          <ac:spMkLst>
-            <pc:docMk/>
-            <pc:sldMk cId="214038350" sldId="260"/>
-            <ac:spMk id="3" creationId="{E6DDA322-6444-733D-E75E-B015139B6938}"/>
-          </ac:spMkLst>
-        </pc:spChg>
-      </pc:sldChg>
-      <pc:sldChg chg="modSp mod modAnim">
-        <pc:chgData name="Schuemie, Martijn [JRDNL]" userId="af052a53-8e28-4f8f-bcc1-00b76bd98f4e" providerId="ADAL" clId="{9CEB1C98-947C-4865-B7E4-26250F9D02CE}" dt="2023-03-16T08:16:21.907" v="1722" actId="27636"/>
-        <pc:sldMkLst>
-          <pc:docMk/>
-          <pc:sldMk cId="3695007226" sldId="261"/>
-        </pc:sldMkLst>
-        <pc:spChg chg="mod">
-          <ac:chgData name="Schuemie, Martijn [JRDNL]" userId="af052a53-8e28-4f8f-bcc1-00b76bd98f4e" providerId="ADAL" clId="{9CEB1C98-947C-4865-B7E4-26250F9D02CE}" dt="2023-03-16T08:16:21.907" v="1722" actId="27636"/>
-          <ac:spMkLst>
-            <pc:docMk/>
-            <pc:sldMk cId="3695007226" sldId="261"/>
-            <ac:spMk id="3" creationId="{6BFE6916-8286-8840-92FC-34C1C4493299}"/>
-          </ac:spMkLst>
-        </pc:spChg>
-      </pc:sldChg>
-      <pc:sldChg chg="del">
-        <pc:chgData name="Schuemie, Martijn [JRDNL]" userId="af052a53-8e28-4f8f-bcc1-00b76bd98f4e" providerId="ADAL" clId="{9CEB1C98-947C-4865-B7E4-26250F9D02CE}" dt="2023-03-16T07:47:52.244" v="463" actId="47"/>
-        <pc:sldMkLst>
-          <pc:docMk/>
-          <pc:sldMk cId="865780318" sldId="263"/>
-        </pc:sldMkLst>
-      </pc:sldChg>
-      <pc:sldChg chg="modSp new mod">
-        <pc:chgData name="Schuemie, Martijn [JRDNL]" userId="af052a53-8e28-4f8f-bcc1-00b76bd98f4e" providerId="ADAL" clId="{9CEB1C98-947C-4865-B7E4-26250F9D02CE}" dt="2023-03-16T07:57:02.560" v="707" actId="20577"/>
-        <pc:sldMkLst>
-          <pc:docMk/>
-          <pc:sldMk cId="3245620795" sldId="263"/>
-        </pc:sldMkLst>
-        <pc:spChg chg="mod">
-          <ac:chgData name="Schuemie, Martijn [JRDNL]" userId="af052a53-8e28-4f8f-bcc1-00b76bd98f4e" providerId="ADAL" clId="{9CEB1C98-947C-4865-B7E4-26250F9D02CE}" dt="2023-03-16T07:48:02.983" v="483" actId="20577"/>
-          <ac:spMkLst>
-            <pc:docMk/>
-            <pc:sldMk cId="3245620795" sldId="263"/>
-            <ac:spMk id="2" creationId="{D3A807A4-DC51-F5E0-3D6B-119D11E0384E}"/>
-          </ac:spMkLst>
-        </pc:spChg>
-        <pc:spChg chg="mod">
-          <ac:chgData name="Schuemie, Martijn [JRDNL]" userId="af052a53-8e28-4f8f-bcc1-00b76bd98f4e" providerId="ADAL" clId="{9CEB1C98-947C-4865-B7E4-26250F9D02CE}" dt="2023-03-16T07:57:02.560" v="707" actId="20577"/>
-          <ac:spMkLst>
-            <pc:docMk/>
-            <pc:sldMk cId="3245620795" sldId="263"/>
-            <ac:spMk id="3" creationId="{AF8B8E43-0C37-CE7A-5F8E-9DEAD6117FF0}"/>
-          </ac:spMkLst>
-        </pc:spChg>
-      </pc:sldChg>
-      <pc:sldChg chg="modSp new mod">
-        <pc:chgData name="Schuemie, Martijn [JRDNL]" userId="af052a53-8e28-4f8f-bcc1-00b76bd98f4e" providerId="ADAL" clId="{9CEB1C98-947C-4865-B7E4-26250F9D02CE}" dt="2023-03-16T08:06:06.290" v="790" actId="5793"/>
-        <pc:sldMkLst>
-          <pc:docMk/>
-          <pc:sldMk cId="1627552034" sldId="264"/>
-        </pc:sldMkLst>
-        <pc:spChg chg="mod">
-          <ac:chgData name="Schuemie, Martijn [JRDNL]" userId="af052a53-8e28-4f8f-bcc1-00b76bd98f4e" providerId="ADAL" clId="{9CEB1C98-947C-4865-B7E4-26250F9D02CE}" dt="2023-03-16T08:03:06.936" v="709"/>
-          <ac:spMkLst>
-            <pc:docMk/>
-            <pc:sldMk cId="1627552034" sldId="264"/>
-            <ac:spMk id="2" creationId="{6810BD4C-FDEC-31E9-74E4-872EA446D64C}"/>
-          </ac:spMkLst>
-        </pc:spChg>
-        <pc:spChg chg="mod">
-          <ac:chgData name="Schuemie, Martijn [JRDNL]" userId="af052a53-8e28-4f8f-bcc1-00b76bd98f4e" providerId="ADAL" clId="{9CEB1C98-947C-4865-B7E4-26250F9D02CE}" dt="2023-03-16T08:06:06.290" v="790" actId="5793"/>
-          <ac:spMkLst>
-            <pc:docMk/>
-            <pc:sldMk cId="1627552034" sldId="264"/>
-            <ac:spMk id="3" creationId="{5C6E4513-2D93-8B15-7C58-F90D8B2D540A}"/>
-          </ac:spMkLst>
-        </pc:spChg>
-      </pc:sldChg>
-      <pc:sldChg chg="modSp new mod">
-        <pc:chgData name="Schuemie, Martijn [JRDNL]" userId="af052a53-8e28-4f8f-bcc1-00b76bd98f4e" providerId="ADAL" clId="{9CEB1C98-947C-4865-B7E4-26250F9D02CE}" dt="2023-03-16T08:09:32.700" v="1132" actId="20577"/>
-        <pc:sldMkLst>
-          <pc:docMk/>
-          <pc:sldMk cId="387441409" sldId="265"/>
-        </pc:sldMkLst>
-        <pc:spChg chg="mod">
-          <ac:chgData name="Schuemie, Martijn [JRDNL]" userId="af052a53-8e28-4f8f-bcc1-00b76bd98f4e" providerId="ADAL" clId="{9CEB1C98-947C-4865-B7E4-26250F9D02CE}" dt="2023-03-16T08:06:27.896" v="792"/>
-          <ac:spMkLst>
-            <pc:docMk/>
-            <pc:sldMk cId="387441409" sldId="265"/>
-            <ac:spMk id="2" creationId="{78A1AE87-F4B1-E413-1DBD-3C480581EB42}"/>
-          </ac:spMkLst>
-        </pc:spChg>
-        <pc:spChg chg="mod">
-          <ac:chgData name="Schuemie, Martijn [JRDNL]" userId="af052a53-8e28-4f8f-bcc1-00b76bd98f4e" providerId="ADAL" clId="{9CEB1C98-947C-4865-B7E4-26250F9D02CE}" dt="2023-03-16T08:09:32.700" v="1132" actId="20577"/>
-          <ac:spMkLst>
-            <pc:docMk/>
-            <pc:sldMk cId="387441409" sldId="265"/>
-            <ac:spMk id="3" creationId="{FAAC0FEE-111C-0BF3-21F6-1B6EC54BD703}"/>
-          </ac:spMkLst>
-        </pc:spChg>
-      </pc:sldChg>
-      <pc:sldChg chg="modSp new mod">
-        <pc:chgData name="Schuemie, Martijn [JRDNL]" userId="af052a53-8e28-4f8f-bcc1-00b76bd98f4e" providerId="ADAL" clId="{9CEB1C98-947C-4865-B7E4-26250F9D02CE}" dt="2023-03-16T08:12:08.059" v="1442"/>
-        <pc:sldMkLst>
-          <pc:docMk/>
-          <pc:sldMk cId="3419704005" sldId="266"/>
-        </pc:sldMkLst>
-        <pc:spChg chg="mod">
-          <ac:chgData name="Schuemie, Martijn [JRDNL]" userId="af052a53-8e28-4f8f-bcc1-00b76bd98f4e" providerId="ADAL" clId="{9CEB1C98-947C-4865-B7E4-26250F9D02CE}" dt="2023-03-16T08:10:34.357" v="1194" actId="20577"/>
-          <ac:spMkLst>
-            <pc:docMk/>
-            <pc:sldMk cId="3419704005" sldId="266"/>
-            <ac:spMk id="2" creationId="{8B8571E8-F670-C062-D66F-165815A8874D}"/>
-          </ac:spMkLst>
-        </pc:spChg>
-        <pc:spChg chg="mod">
-          <ac:chgData name="Schuemie, Martijn [JRDNL]" userId="af052a53-8e28-4f8f-bcc1-00b76bd98f4e" providerId="ADAL" clId="{9CEB1C98-947C-4865-B7E4-26250F9D02CE}" dt="2023-03-16T08:12:08.059" v="1442"/>
-          <ac:spMkLst>
-            <pc:docMk/>
-            <pc:sldMk cId="3419704005" sldId="266"/>
-            <ac:spMk id="3" creationId="{4F139CC0-DBEF-E4A3-1378-8A36C29D0C0F}"/>
-          </ac:spMkLst>
-        </pc:spChg>
-      </pc:sldChg>
-      <pc:sldChg chg="modSp new mod">
-        <pc:chgData name="Schuemie, Martijn [JRDNL]" userId="af052a53-8e28-4f8f-bcc1-00b76bd98f4e" providerId="ADAL" clId="{9CEB1C98-947C-4865-B7E4-26250F9D02CE}" dt="2023-03-16T08:15:35.057" v="1661" actId="20577"/>
-        <pc:sldMkLst>
-          <pc:docMk/>
-          <pc:sldMk cId="1216664922" sldId="267"/>
-        </pc:sldMkLst>
-        <pc:spChg chg="mod">
-          <ac:chgData name="Schuemie, Martijn [JRDNL]" userId="af052a53-8e28-4f8f-bcc1-00b76bd98f4e" providerId="ADAL" clId="{9CEB1C98-947C-4865-B7E4-26250F9D02CE}" dt="2023-03-16T08:13:15.524" v="1492" actId="20577"/>
-          <ac:spMkLst>
-            <pc:docMk/>
-            <pc:sldMk cId="1216664922" sldId="267"/>
-            <ac:spMk id="2" creationId="{E92F4414-A0DB-B547-01E6-7053578E0779}"/>
-          </ac:spMkLst>
-        </pc:spChg>
-        <pc:spChg chg="mod">
-          <ac:chgData name="Schuemie, Martijn [JRDNL]" userId="af052a53-8e28-4f8f-bcc1-00b76bd98f4e" providerId="ADAL" clId="{9CEB1C98-947C-4865-B7E4-26250F9D02CE}" dt="2023-03-16T08:15:35.057" v="1661" actId="20577"/>
-          <ac:spMkLst>
-            <pc:docMk/>
-            <pc:sldMk cId="1216664922" sldId="267"/>
-            <ac:spMk id="3" creationId="{C11BC3E1-EC5C-6952-3D5C-4CB6EE6158E0}"/>
-          </ac:spMkLst>
-        </pc:spChg>
-      </pc:sldChg>
-      <pc:sldChg chg="new del">
-        <pc:chgData name="Schuemie, Martijn [JRDNL]" userId="af052a53-8e28-4f8f-bcc1-00b76bd98f4e" providerId="ADAL" clId="{9CEB1C98-947C-4865-B7E4-26250F9D02CE}" dt="2023-03-16T08:13:06.246" v="1475" actId="47"/>
-        <pc:sldMkLst>
-          <pc:docMk/>
-          <pc:sldMk cId="2903604858" sldId="267"/>
-        </pc:sldMkLst>
-      </pc:sldChg>
-      <pc:sldChg chg="modSp new mod">
-        <pc:chgData name="Schuemie, Martijn [JRDNL]" userId="af052a53-8e28-4f8f-bcc1-00b76bd98f4e" providerId="ADAL" clId="{9CEB1C98-947C-4865-B7E4-26250F9D02CE}" dt="2023-03-16T08:24:58.589" v="1743" actId="20577"/>
-        <pc:sldMkLst>
-          <pc:docMk/>
-          <pc:sldMk cId="882376883" sldId="268"/>
-        </pc:sldMkLst>
-        <pc:spChg chg="mod">
-          <ac:chgData name="Schuemie, Martijn [JRDNL]" userId="af052a53-8e28-4f8f-bcc1-00b76bd98f4e" providerId="ADAL" clId="{9CEB1C98-947C-4865-B7E4-26250F9D02CE}" dt="2023-03-16T08:24:58.589" v="1743" actId="20577"/>
-          <ac:spMkLst>
-            <pc:docMk/>
-            <pc:sldMk cId="882376883" sldId="268"/>
-            <ac:spMk id="2" creationId="{5079BF75-D24C-7696-93E8-52BEFA2AC599}"/>
           </ac:spMkLst>
         </pc:spChg>
       </pc:sldChg>
@@ -1938,7 +1939,7 @@
           <a:p>
             <a:fld id="{0CB52742-373F-4A87-92C3-F1BD6DE2FDEE}" type="datetimeFigureOut">
               <a:rPr lang="en-US" smtClean="0"/>
-              <a:t>6/29/2023</a:t>
+              <a:t>5/23/24</a:t>
             </a:fld>
             <a:endParaRPr lang="en-US"/>
           </a:p>
@@ -4096,6 +4097,601 @@
       </p:grpSpPr>
       <p:sp>
         <p:nvSpPr>
+          <p:cNvPr id="2" name="Title 1">
+            <a:extLst>
+              <a:ext uri="{FF2B5EF4-FFF2-40B4-BE49-F238E27FC236}">
+                <a16:creationId xmlns:a16="http://schemas.microsoft.com/office/drawing/2014/main" id="{555FA874-31F8-2A0B-6258-BB278E584894}"/>
+              </a:ext>
+            </a:extLst>
+          </p:cNvPr>
+          <p:cNvSpPr>
+            <a:spLocks noGrp="1"/>
+          </p:cNvSpPr>
+          <p:nvPr>
+            <p:ph type="title"/>
+          </p:nvPr>
+        </p:nvSpPr>
+        <p:spPr/>
+        <p:txBody>
+          <a:bodyPr/>
+          <a:lstStyle/>
+          <a:p>
+            <a:r>
+              <a:rPr lang="en-US" dirty="0"/>
+              <a:t>Publications using HADES</a:t>
+            </a:r>
+          </a:p>
+        </p:txBody>
+      </p:sp>
+      <p:sp>
+        <p:nvSpPr>
+          <p:cNvPr id="3" name="Content Placeholder 2">
+            <a:extLst>
+              <a:ext uri="{FF2B5EF4-FFF2-40B4-BE49-F238E27FC236}">
+                <a16:creationId xmlns:a16="http://schemas.microsoft.com/office/drawing/2014/main" id="{70E5FEF2-F225-1B50-116E-6778C1D60FD2}"/>
+              </a:ext>
+            </a:extLst>
+          </p:cNvPr>
+          <p:cNvSpPr>
+            <a:spLocks noGrp="1"/>
+          </p:cNvSpPr>
+          <p:nvPr>
+            <p:ph idx="1"/>
+          </p:nvPr>
+        </p:nvSpPr>
+        <p:spPr/>
+        <p:txBody>
+          <a:bodyPr/>
+          <a:lstStyle/>
+          <a:p>
+            <a:r>
+              <a:rPr lang="en-US" dirty="0"/>
+              <a:t>44 peer-reviewed clinical research papers</a:t>
+            </a:r>
+          </a:p>
+          <a:p>
+            <a:r>
+              <a:rPr lang="en-US" dirty="0"/>
+              <a:t>40 methods research papers</a:t>
+            </a:r>
+          </a:p>
+        </p:txBody>
+      </p:sp>
+      <p:grpSp>
+        <p:nvGrpSpPr>
+          <p:cNvPr id="4" name="Group 3">
+            <a:extLst>
+              <a:ext uri="{FF2B5EF4-FFF2-40B4-BE49-F238E27FC236}">
+                <a16:creationId xmlns:a16="http://schemas.microsoft.com/office/drawing/2014/main" id="{76541275-E283-3FFF-7A0A-43A8ED6F3B52}"/>
+              </a:ext>
+            </a:extLst>
+          </p:cNvPr>
+          <p:cNvGrpSpPr/>
+          <p:nvPr/>
+        </p:nvGrpSpPr>
+        <p:grpSpPr>
+          <a:xfrm>
+            <a:off x="0" y="2667000"/>
+            <a:ext cx="5562600" cy="4552168"/>
+            <a:chOff x="0" y="1748916"/>
+            <a:chExt cx="6744753" cy="5519586"/>
+          </a:xfrm>
+        </p:grpSpPr>
+        <p:pic>
+          <p:nvPicPr>
+            <p:cNvPr id="5" name="Picture 4">
+              <a:extLst>
+                <a:ext uri="{FF2B5EF4-FFF2-40B4-BE49-F238E27FC236}">
+                  <a16:creationId xmlns:a16="http://schemas.microsoft.com/office/drawing/2014/main" id="{F20FA8D4-8C79-20DF-0728-BEA5D272EF53}"/>
+                </a:ext>
+              </a:extLst>
+            </p:cNvPr>
+            <p:cNvPicPr>
+              <a:picLocks noChangeAspect="1"/>
+            </p:cNvPicPr>
+            <p:nvPr/>
+          </p:nvPicPr>
+          <p:blipFill rotWithShape="1">
+            <a:blip r:embed="rId2" cstate="print">
+              <a:extLst>
+                <a:ext uri="{28A0092B-C50C-407E-A947-70E740481C1C}">
+                  <a14:useLocalDpi xmlns:a14="http://schemas.microsoft.com/office/drawing/2010/main" val="0"/>
+                </a:ext>
+              </a:extLst>
+            </a:blip>
+            <a:srcRect b="-8121"/>
+            <a:stretch/>
+          </p:blipFill>
+          <p:spPr>
+            <a:xfrm>
+              <a:off x="0" y="1748916"/>
+              <a:ext cx="6744753" cy="5519586"/>
+            </a:xfrm>
+            <a:prstGeom prst="rect">
+              <a:avLst/>
+            </a:prstGeom>
+            <a:ln>
+              <a:noFill/>
+            </a:ln>
+            <a:effectLst>
+              <a:outerShdw blurRad="292100" dist="139700" dir="2700000" algn="tl" rotWithShape="0">
+                <a:srgbClr val="333333">
+                  <a:alpha val="65000"/>
+                </a:srgbClr>
+              </a:outerShdw>
+            </a:effectLst>
+          </p:spPr>
+        </p:pic>
+        <p:pic>
+          <p:nvPicPr>
+            <p:cNvPr id="6" name="Picture 5">
+              <a:extLst>
+                <a:ext uri="{FF2B5EF4-FFF2-40B4-BE49-F238E27FC236}">
+                  <a16:creationId xmlns:a16="http://schemas.microsoft.com/office/drawing/2014/main" id="{4073CDCA-BF7A-4924-D26E-050E04EFF78B}"/>
+                </a:ext>
+              </a:extLst>
+            </p:cNvPr>
+            <p:cNvPicPr>
+              <a:picLocks noChangeAspect="1"/>
+            </p:cNvPicPr>
+            <p:nvPr/>
+          </p:nvPicPr>
+          <p:blipFill>
+            <a:blip r:embed="rId3">
+              <a:extLst>
+                <a:ext uri="{28A0092B-C50C-407E-A947-70E740481C1C}">
+                  <a14:useLocalDpi xmlns:a14="http://schemas.microsoft.com/office/drawing/2010/main" val="0"/>
+                </a:ext>
+              </a:extLst>
+            </a:blip>
+            <a:stretch>
+              <a:fillRect/>
+            </a:stretch>
+          </p:blipFill>
+          <p:spPr>
+            <a:xfrm>
+              <a:off x="182380" y="1836506"/>
+              <a:ext cx="1876425" cy="380928"/>
+            </a:xfrm>
+            <a:prstGeom prst="rect">
+              <a:avLst/>
+            </a:prstGeom>
+          </p:spPr>
+        </p:pic>
+      </p:grpSp>
+      <p:pic>
+        <p:nvPicPr>
+          <p:cNvPr id="8" name="Picture 7">
+            <a:extLst>
+              <a:ext uri="{FF2B5EF4-FFF2-40B4-BE49-F238E27FC236}">
+                <a16:creationId xmlns:a16="http://schemas.microsoft.com/office/drawing/2014/main" id="{05371E2D-28D1-E759-4374-D7BE09068B90}"/>
+              </a:ext>
+            </a:extLst>
+          </p:cNvPr>
+          <p:cNvPicPr>
+            <a:picLocks noChangeAspect="1"/>
+          </p:cNvPicPr>
+          <p:nvPr/>
+        </p:nvPicPr>
+        <p:blipFill>
+          <a:blip r:embed="rId4"/>
+          <a:stretch>
+            <a:fillRect/>
+          </a:stretch>
+        </p:blipFill>
+        <p:spPr>
+          <a:xfrm>
+            <a:off x="910332" y="4144302"/>
+            <a:ext cx="4953926" cy="3124200"/>
+          </a:xfrm>
+          <a:prstGeom prst="rect">
+            <a:avLst/>
+          </a:prstGeom>
+          <a:ln>
+            <a:noFill/>
+          </a:ln>
+          <a:effectLst>
+            <a:outerShdw blurRad="292100" dist="139700" dir="2700000" algn="tl" rotWithShape="0">
+              <a:srgbClr val="333333">
+                <a:alpha val="65000"/>
+              </a:srgbClr>
+            </a:outerShdw>
+          </a:effectLst>
+        </p:spPr>
+      </p:pic>
+      <p:pic>
+        <p:nvPicPr>
+          <p:cNvPr id="10" name="Picture 9">
+            <a:extLst>
+              <a:ext uri="{FF2B5EF4-FFF2-40B4-BE49-F238E27FC236}">
+                <a16:creationId xmlns:a16="http://schemas.microsoft.com/office/drawing/2014/main" id="{9BBCCBDE-F1D5-2B33-010E-8E0C16BDBCA9}"/>
+              </a:ext>
+            </a:extLst>
+          </p:cNvPr>
+          <p:cNvPicPr>
+            <a:picLocks noChangeAspect="1"/>
+          </p:cNvPicPr>
+          <p:nvPr/>
+        </p:nvPicPr>
+        <p:blipFill>
+          <a:blip r:embed="rId5"/>
+          <a:stretch>
+            <a:fillRect/>
+          </a:stretch>
+        </p:blipFill>
+        <p:spPr>
+          <a:xfrm>
+            <a:off x="5486400" y="3635968"/>
+            <a:ext cx="5486400" cy="3209168"/>
+          </a:xfrm>
+          <a:prstGeom prst="rect">
+            <a:avLst/>
+          </a:prstGeom>
+          <a:ln>
+            <a:noFill/>
+          </a:ln>
+          <a:effectLst>
+            <a:outerShdw blurRad="292100" dist="139700" dir="2700000" algn="tl" rotWithShape="0">
+              <a:srgbClr val="333333">
+                <a:alpha val="65000"/>
+              </a:srgbClr>
+            </a:outerShdw>
+          </a:effectLst>
+        </p:spPr>
+      </p:pic>
+      <p:pic>
+        <p:nvPicPr>
+          <p:cNvPr id="12" name="Picture 11">
+            <a:extLst>
+              <a:ext uri="{FF2B5EF4-FFF2-40B4-BE49-F238E27FC236}">
+                <a16:creationId xmlns:a16="http://schemas.microsoft.com/office/drawing/2014/main" id="{5B9EA946-01BE-D20F-7049-5201F4758969}"/>
+              </a:ext>
+            </a:extLst>
+          </p:cNvPr>
+          <p:cNvPicPr>
+            <a:picLocks noChangeAspect="1"/>
+          </p:cNvPicPr>
+          <p:nvPr/>
+        </p:nvPicPr>
+        <p:blipFill>
+          <a:blip r:embed="rId6"/>
+          <a:stretch>
+            <a:fillRect/>
+          </a:stretch>
+        </p:blipFill>
+        <p:spPr>
+          <a:xfrm>
+            <a:off x="6472932" y="4785307"/>
+            <a:ext cx="5638800" cy="2681713"/>
+          </a:xfrm>
+          <a:prstGeom prst="rect">
+            <a:avLst/>
+          </a:prstGeom>
+          <a:ln>
+            <a:noFill/>
+          </a:ln>
+          <a:effectLst>
+            <a:outerShdw blurRad="292100" dist="139700" dir="2700000" algn="tl" rotWithShape="0">
+              <a:srgbClr val="333333">
+                <a:alpha val="65000"/>
+              </a:srgbClr>
+            </a:outerShdw>
+          </a:effectLst>
+        </p:spPr>
+      </p:pic>
+      <p:sp>
+        <p:nvSpPr>
+          <p:cNvPr id="13" name="Slide Number Placeholder 12">
+            <a:extLst>
+              <a:ext uri="{FF2B5EF4-FFF2-40B4-BE49-F238E27FC236}">
+                <a16:creationId xmlns:a16="http://schemas.microsoft.com/office/drawing/2014/main" id="{CAEA88F5-4F2D-231B-EFD7-E78B10F6ED4F}"/>
+              </a:ext>
+            </a:extLst>
+          </p:cNvPr>
+          <p:cNvSpPr>
+            <a:spLocks noGrp="1"/>
+          </p:cNvSpPr>
+          <p:nvPr>
+            <p:ph type="sldNum" sz="quarter" idx="4"/>
+          </p:nvPr>
+        </p:nvSpPr>
+        <p:spPr/>
+        <p:txBody>
+          <a:bodyPr/>
+          <a:lstStyle/>
+          <a:p>
+            <a:fld id="{444583ED-F364-40B3-B25B-483B5033DFA3}" type="slidenum">
+              <a:rPr lang="en-US" smtClean="0"/>
+              <a:pPr/>
+              <a:t>10</a:t>
+            </a:fld>
+            <a:endParaRPr lang="en-US"/>
+          </a:p>
+        </p:txBody>
+      </p:sp>
+      <p:sp>
+        <p:nvSpPr>
+          <p:cNvPr id="7" name="TextBox 6">
+            <a:extLst>
+              <a:ext uri="{FF2B5EF4-FFF2-40B4-BE49-F238E27FC236}">
+                <a16:creationId xmlns:a16="http://schemas.microsoft.com/office/drawing/2014/main" id="{6FA36E33-359D-2E63-A042-F2875A6526A2}"/>
+              </a:ext>
+            </a:extLst>
+          </p:cNvPr>
+          <p:cNvSpPr txBox="1"/>
+          <p:nvPr/>
+        </p:nvSpPr>
+        <p:spPr>
+          <a:xfrm>
+            <a:off x="605814" y="2183368"/>
+            <a:ext cx="4753481" cy="369332"/>
+          </a:xfrm>
+          <a:prstGeom prst="rect">
+            <a:avLst/>
+          </a:prstGeom>
+          <a:noFill/>
+        </p:spPr>
+        <p:txBody>
+          <a:bodyPr wrap="none" rtlCol="0">
+            <a:spAutoFit/>
+          </a:bodyPr>
+          <a:lstStyle/>
+          <a:p>
+            <a:r>
+              <a:rPr lang="en-US" dirty="0">
+                <a:hlinkClick r:id="rId7"/>
+              </a:rPr>
+              <a:t>https://ohdsi.github.io/Hades/publications.html</a:t>
+            </a:r>
+            <a:r>
+              <a:rPr lang="en-US" dirty="0"/>
+              <a:t> </a:t>
+            </a:r>
+          </a:p>
+        </p:txBody>
+      </p:sp>
+    </p:spTree>
+    <p:extLst>
+      <p:ext uri="{BB962C8B-B14F-4D97-AF65-F5344CB8AC3E}">
+        <p14:creationId xmlns:p14="http://schemas.microsoft.com/office/powerpoint/2010/main" val="2503642623"/>
+      </p:ext>
+    </p:extLst>
+  </p:cSld>
+  <p:clrMapOvr>
+    <a:masterClrMapping/>
+  </p:clrMapOvr>
+  <p:timing>
+    <p:tnLst>
+      <p:par>
+        <p:cTn id="1" dur="indefinite" restart="never" nodeType="tmRoot">
+          <p:childTnLst>
+            <p:seq concurrent="1" nextAc="seek">
+              <p:cTn id="2" dur="indefinite" nodeType="mainSeq">
+                <p:childTnLst>
+                  <p:par>
+                    <p:cTn id="3" fill="hold">
+                      <p:stCondLst>
+                        <p:cond delay="indefinite"/>
+                      </p:stCondLst>
+                      <p:childTnLst>
+                        <p:par>
+                          <p:cTn id="4" fill="hold">
+                            <p:stCondLst>
+                              <p:cond delay="0"/>
+                            </p:stCondLst>
+                            <p:childTnLst>
+                              <p:par>
+                                <p:cTn id="5" presetID="1" presetClass="entr" presetSubtype="0" fill="hold" nodeType="clickEffect">
+                                  <p:stCondLst>
+                                    <p:cond delay="0"/>
+                                  </p:stCondLst>
+                                  <p:childTnLst>
+                                    <p:set>
+                                      <p:cBhvr>
+                                        <p:cTn id="6" dur="1" fill="hold">
+                                          <p:stCondLst>
+                                            <p:cond delay="0"/>
+                                          </p:stCondLst>
+                                        </p:cTn>
+                                        <p:tgtEl>
+                                          <p:spTgt spid="4"/>
+                                        </p:tgtEl>
+                                        <p:attrNameLst>
+                                          <p:attrName>style.visibility</p:attrName>
+                                        </p:attrNameLst>
+                                      </p:cBhvr>
+                                      <p:to>
+                                        <p:strVal val="visible"/>
+                                      </p:to>
+                                    </p:set>
+                                  </p:childTnLst>
+                                </p:cTn>
+                              </p:par>
+                            </p:childTnLst>
+                          </p:cTn>
+                        </p:par>
+                      </p:childTnLst>
+                    </p:cTn>
+                  </p:par>
+                  <p:par>
+                    <p:cTn id="7" fill="hold">
+                      <p:stCondLst>
+                        <p:cond delay="indefinite"/>
+                      </p:stCondLst>
+                      <p:childTnLst>
+                        <p:par>
+                          <p:cTn id="8" fill="hold">
+                            <p:stCondLst>
+                              <p:cond delay="0"/>
+                            </p:stCondLst>
+                            <p:childTnLst>
+                              <p:par>
+                                <p:cTn id="9" presetID="1" presetClass="entr" presetSubtype="0" fill="hold" nodeType="clickEffect">
+                                  <p:stCondLst>
+                                    <p:cond delay="0"/>
+                                  </p:stCondLst>
+                                  <p:childTnLst>
+                                    <p:set>
+                                      <p:cBhvr>
+                                        <p:cTn id="10" dur="1" fill="hold">
+                                          <p:stCondLst>
+                                            <p:cond delay="0"/>
+                                          </p:stCondLst>
+                                        </p:cTn>
+                                        <p:tgtEl>
+                                          <p:spTgt spid="8"/>
+                                        </p:tgtEl>
+                                        <p:attrNameLst>
+                                          <p:attrName>style.visibility</p:attrName>
+                                        </p:attrNameLst>
+                                      </p:cBhvr>
+                                      <p:to>
+                                        <p:strVal val="visible"/>
+                                      </p:to>
+                                    </p:set>
+                                  </p:childTnLst>
+                                </p:cTn>
+                              </p:par>
+                            </p:childTnLst>
+                          </p:cTn>
+                        </p:par>
+                      </p:childTnLst>
+                    </p:cTn>
+                  </p:par>
+                  <p:par>
+                    <p:cTn id="11" fill="hold">
+                      <p:stCondLst>
+                        <p:cond delay="indefinite"/>
+                      </p:stCondLst>
+                      <p:childTnLst>
+                        <p:par>
+                          <p:cTn id="12" fill="hold">
+                            <p:stCondLst>
+                              <p:cond delay="0"/>
+                            </p:stCondLst>
+                            <p:childTnLst>
+                              <p:par>
+                                <p:cTn id="13" presetID="1" presetClass="entr" presetSubtype="0" fill="hold" nodeType="clickEffect">
+                                  <p:stCondLst>
+                                    <p:cond delay="0"/>
+                                  </p:stCondLst>
+                                  <p:childTnLst>
+                                    <p:set>
+                                      <p:cBhvr>
+                                        <p:cTn id="14" dur="1" fill="hold">
+                                          <p:stCondLst>
+                                            <p:cond delay="0"/>
+                                          </p:stCondLst>
+                                        </p:cTn>
+                                        <p:tgtEl>
+                                          <p:spTgt spid="10"/>
+                                        </p:tgtEl>
+                                        <p:attrNameLst>
+                                          <p:attrName>style.visibility</p:attrName>
+                                        </p:attrNameLst>
+                                      </p:cBhvr>
+                                      <p:to>
+                                        <p:strVal val="visible"/>
+                                      </p:to>
+                                    </p:set>
+                                  </p:childTnLst>
+                                </p:cTn>
+                              </p:par>
+                            </p:childTnLst>
+                          </p:cTn>
+                        </p:par>
+                      </p:childTnLst>
+                    </p:cTn>
+                  </p:par>
+                  <p:par>
+                    <p:cTn id="15" fill="hold">
+                      <p:stCondLst>
+                        <p:cond delay="indefinite"/>
+                      </p:stCondLst>
+                      <p:childTnLst>
+                        <p:par>
+                          <p:cTn id="16" fill="hold">
+                            <p:stCondLst>
+                              <p:cond delay="0"/>
+                            </p:stCondLst>
+                            <p:childTnLst>
+                              <p:par>
+                                <p:cTn id="17" presetID="1" presetClass="entr" presetSubtype="0" fill="hold" nodeType="clickEffect">
+                                  <p:stCondLst>
+                                    <p:cond delay="0"/>
+                                  </p:stCondLst>
+                                  <p:childTnLst>
+                                    <p:set>
+                                      <p:cBhvr>
+                                        <p:cTn id="18" dur="1" fill="hold">
+                                          <p:stCondLst>
+                                            <p:cond delay="0"/>
+                                          </p:stCondLst>
+                                        </p:cTn>
+                                        <p:tgtEl>
+                                          <p:spTgt spid="12"/>
+                                        </p:tgtEl>
+                                        <p:attrNameLst>
+                                          <p:attrName>style.visibility</p:attrName>
+                                        </p:attrNameLst>
+                                      </p:cBhvr>
+                                      <p:to>
+                                        <p:strVal val="visible"/>
+                                      </p:to>
+                                    </p:set>
+                                  </p:childTnLst>
+                                </p:cTn>
+                              </p:par>
+                            </p:childTnLst>
+                          </p:cTn>
+                        </p:par>
+                      </p:childTnLst>
+                    </p:cTn>
+                  </p:par>
+                </p:childTnLst>
+              </p:cTn>
+              <p:prevCondLst>
+                <p:cond evt="onPrev" delay="0">
+                  <p:tgtEl>
+                    <p:sldTgt/>
+                  </p:tgtEl>
+                </p:cond>
+              </p:prevCondLst>
+              <p:nextCondLst>
+                <p:cond evt="onNext" delay="0">
+                  <p:tgtEl>
+                    <p:sldTgt/>
+                  </p:tgtEl>
+                </p:cond>
+              </p:nextCondLst>
+            </p:seq>
+          </p:childTnLst>
+        </p:cTn>
+      </p:par>
+    </p:tnLst>
+  </p:timing>
+</p:sld>
+</file>
+
+<file path=ppt/slides/slide11.xml><?xml version="1.0" encoding="utf-8"?>
+<p:sld xmlns:a="http://schemas.openxmlformats.org/drawingml/2006/main" xmlns:r="http://schemas.openxmlformats.org/officeDocument/2006/relationships" xmlns:p="http://schemas.openxmlformats.org/presentationml/2006/main">
+  <p:cSld>
+    <p:spTree>
+      <p:nvGrpSpPr>
+        <p:cNvPr id="1" name=""/>
+        <p:cNvGrpSpPr/>
+        <p:nvPr/>
+      </p:nvGrpSpPr>
+      <p:grpSpPr>
+        <a:xfrm>
+          <a:off x="0" y="0"/>
+          <a:ext cx="0" cy="0"/>
+          <a:chOff x="0" y="0"/>
+          <a:chExt cx="0" cy="0"/>
+        </a:xfrm>
+      </p:grpSpPr>
+      <p:sp>
+        <p:nvSpPr>
           <p:cNvPr id="5" name="Title 4">
             <a:extLst>
               <a:ext uri="{FF2B5EF4-FFF2-40B4-BE49-F238E27FC236}">
@@ -4155,7 +4751,7 @@
             <a:fld id="{444583ED-F364-40B3-B25B-483B5033DFA3}" type="slidenum">
               <a:rPr lang="en-US" smtClean="0"/>
               <a:pPr algn="r"/>
-              <a:t>10</a:t>
+              <a:t>11</a:t>
             </a:fld>
             <a:endParaRPr lang="en-US" dirty="0"/>
           </a:p>
@@ -4199,7 +4795,7 @@
 </p:sld>
 </file>
 
-<file path=ppt/slides/slide11.xml><?xml version="1.0" encoding="utf-8"?>
+<file path=ppt/slides/slide12.xml><?xml version="1.0" encoding="utf-8"?>
 <p:sld xmlns:a="http://schemas.openxmlformats.org/drawingml/2006/main" xmlns:r="http://schemas.openxmlformats.org/officeDocument/2006/relationships" xmlns:p="http://schemas.openxmlformats.org/presentationml/2006/main">
   <p:cSld>
     <p:spTree>
@@ -5077,7 +5673,7 @@
             <a:fld id="{444583ED-F364-40B3-B25B-483B5033DFA3}" type="slidenum">
               <a:rPr lang="en-US" smtClean="0"/>
               <a:pPr/>
-              <a:t>11</a:t>
+              <a:t>12</a:t>
             </a:fld>
             <a:endParaRPr lang="en-US"/>
           </a:p>
@@ -5096,7 +5692,7 @@
 </p:sld>
 </file>
 
-<file path=ppt/slides/slide12.xml><?xml version="1.0" encoding="utf-8"?>
+<file path=ppt/slides/slide13.xml><?xml version="1.0" encoding="utf-8"?>
 <p:sld xmlns:a="http://schemas.openxmlformats.org/drawingml/2006/main" xmlns:r="http://schemas.openxmlformats.org/officeDocument/2006/relationships" xmlns:p="http://schemas.openxmlformats.org/presentationml/2006/main">
   <p:cSld>
     <p:spTree>
@@ -6045,7 +6641,7 @@
             <a:fld id="{444583ED-F364-40B3-B25B-483B5033DFA3}" type="slidenum">
               <a:rPr lang="en-US" smtClean="0"/>
               <a:pPr/>
-              <a:t>12</a:t>
+              <a:t>13</a:t>
             </a:fld>
             <a:endParaRPr lang="en-US"/>
           </a:p>
@@ -6064,7 +6660,7 @@
 </p:sld>
 </file>
 
-<file path=ppt/slides/slide13.xml><?xml version="1.0" encoding="utf-8"?>
+<file path=ppt/slides/slide14.xml><?xml version="1.0" encoding="utf-8"?>
 <p:sld xmlns:a="http://schemas.openxmlformats.org/drawingml/2006/main" xmlns:r="http://schemas.openxmlformats.org/officeDocument/2006/relationships" xmlns:p="http://schemas.openxmlformats.org/presentationml/2006/main">
   <p:cSld>
     <p:spTree>
@@ -7058,7 +7654,7 @@
             <a:fld id="{444583ED-F364-40B3-B25B-483B5033DFA3}" type="slidenum">
               <a:rPr lang="en-US" smtClean="0"/>
               <a:pPr/>
-              <a:t>13</a:t>
+              <a:t>14</a:t>
             </a:fld>
             <a:endParaRPr lang="en-US"/>
           </a:p>
@@ -7077,7 +7673,7 @@
 </p:sld>
 </file>
 
-<file path=ppt/slides/slide14.xml><?xml version="1.0" encoding="utf-8"?>
+<file path=ppt/slides/slide15.xml><?xml version="1.0" encoding="utf-8"?>
 <p:sld xmlns:a="http://schemas.openxmlformats.org/drawingml/2006/main" xmlns:r="http://schemas.openxmlformats.org/officeDocument/2006/relationships" xmlns:p="http://schemas.openxmlformats.org/presentationml/2006/main">
   <p:cSld>
     <p:spTree>
@@ -8194,7 +8790,7 @@
             <a:fld id="{444583ED-F364-40B3-B25B-483B5033DFA3}" type="slidenum">
               <a:rPr lang="en-US" smtClean="0"/>
               <a:pPr/>
-              <a:t>14</a:t>
+              <a:t>15</a:t>
             </a:fld>
             <a:endParaRPr lang="en-US"/>
           </a:p>
@@ -8330,7 +8926,7 @@
 </p:sld>
 </file>
 
-<file path=ppt/slides/slide15.xml><?xml version="1.0" encoding="utf-8"?>
+<file path=ppt/slides/slide16.xml><?xml version="1.0" encoding="utf-8"?>
 <p:sld xmlns:a="http://schemas.openxmlformats.org/drawingml/2006/main" xmlns:r="http://schemas.openxmlformats.org/officeDocument/2006/relationships" xmlns:p="http://schemas.openxmlformats.org/presentationml/2006/main">
   <p:cSld>
     <p:spTree>
@@ -9453,7 +10049,7 @@
             <a:fld id="{444583ED-F364-40B3-B25B-483B5033DFA3}" type="slidenum">
               <a:rPr lang="en-US" smtClean="0"/>
               <a:pPr/>
-              <a:t>15</a:t>
+              <a:t>16</a:t>
             </a:fld>
             <a:endParaRPr lang="en-US"/>
           </a:p>
@@ -9472,7 +10068,7 @@
 </p:sld>
 </file>
 
-<file path=ppt/slides/slide16.xml><?xml version="1.0" encoding="utf-8"?>
+<file path=ppt/slides/slide17.xml><?xml version="1.0" encoding="utf-8"?>
 <p:sld xmlns:a="http://schemas.openxmlformats.org/drawingml/2006/main" xmlns:r="http://schemas.openxmlformats.org/officeDocument/2006/relationships" xmlns:p="http://schemas.openxmlformats.org/presentationml/2006/main">
   <p:cSld>
     <p:spTree>
@@ -10601,7 +11197,7 @@
             <a:fld id="{444583ED-F364-40B3-B25B-483B5033DFA3}" type="slidenum">
               <a:rPr lang="en-US" smtClean="0"/>
               <a:pPr/>
-              <a:t>16</a:t>
+              <a:t>17</a:t>
             </a:fld>
             <a:endParaRPr lang="en-US"/>
           </a:p>
@@ -10737,7 +11333,7 @@
 </p:sld>
 </file>
 
-<file path=ppt/slides/slide17.xml><?xml version="1.0" encoding="utf-8"?>
+<file path=ppt/slides/slide18.xml><?xml version="1.0" encoding="utf-8"?>
 <p:sld xmlns:a="http://schemas.openxmlformats.org/drawingml/2006/main" xmlns:r="http://schemas.openxmlformats.org/officeDocument/2006/relationships" xmlns:p="http://schemas.openxmlformats.org/presentationml/2006/main">
   <p:cSld>
     <p:spTree>
@@ -11263,7 +11859,7 @@
             <a:fld id="{444583ED-F364-40B3-B25B-483B5033DFA3}" type="slidenum">
               <a:rPr lang="en-US" smtClean="0"/>
               <a:pPr/>
-              <a:t>17</a:t>
+              <a:t>18</a:t>
             </a:fld>
             <a:endParaRPr lang="en-US"/>
           </a:p>
@@ -11357,7 +11953,7 @@
 </p:sld>
 </file>
 
-<file path=ppt/slides/slide18.xml><?xml version="1.0" encoding="utf-8"?>
+<file path=ppt/slides/slide19.xml><?xml version="1.0" encoding="utf-8"?>
 <p:sld xmlns:a="http://schemas.openxmlformats.org/drawingml/2006/main" xmlns:r="http://schemas.openxmlformats.org/officeDocument/2006/relationships" xmlns:p="http://schemas.openxmlformats.org/presentationml/2006/main">
   <p:cSld>
     <p:spTree>
@@ -12057,7 +12653,7 @@
             <a:fld id="{444583ED-F364-40B3-B25B-483B5033DFA3}" type="slidenum">
               <a:rPr lang="en-US" smtClean="0"/>
               <a:pPr/>
-              <a:t>18</a:t>
+              <a:t>19</a:t>
             </a:fld>
             <a:endParaRPr lang="en-US"/>
           </a:p>
@@ -12196,7 +12792,152 @@
 </p:sld>
 </file>
 
-<file path=ppt/slides/slide19.xml><?xml version="1.0" encoding="utf-8"?>
+<file path=ppt/slides/slide2.xml><?xml version="1.0" encoding="utf-8"?>
+<p:sld xmlns:a="http://schemas.openxmlformats.org/drawingml/2006/main" xmlns:r="http://schemas.openxmlformats.org/officeDocument/2006/relationships" xmlns:p="http://schemas.openxmlformats.org/presentationml/2006/main">
+  <p:cSld>
+    <p:spTree>
+      <p:nvGrpSpPr>
+        <p:cNvPr id="1" name=""/>
+        <p:cNvGrpSpPr/>
+        <p:nvPr/>
+      </p:nvGrpSpPr>
+      <p:grpSpPr>
+        <a:xfrm>
+          <a:off x="0" y="0"/>
+          <a:ext cx="0" cy="0"/>
+          <a:chOff x="0" y="0"/>
+          <a:chExt cx="0" cy="0"/>
+        </a:xfrm>
+      </p:grpSpPr>
+      <p:sp>
+        <p:nvSpPr>
+          <p:cNvPr id="2" name="Title 1">
+            <a:extLst>
+              <a:ext uri="{FF2B5EF4-FFF2-40B4-BE49-F238E27FC236}">
+                <a16:creationId xmlns:a16="http://schemas.microsoft.com/office/drawing/2014/main" id="{FD61DFA2-E76E-53FE-FEFF-6B658CB7B136}"/>
+              </a:ext>
+            </a:extLst>
+          </p:cNvPr>
+          <p:cNvSpPr>
+            <a:spLocks noGrp="1"/>
+          </p:cNvSpPr>
+          <p:nvPr>
+            <p:ph type="title"/>
+          </p:nvPr>
+        </p:nvSpPr>
+        <p:spPr/>
+        <p:txBody>
+          <a:bodyPr/>
+          <a:lstStyle/>
+          <a:p>
+            <a:r>
+              <a:rPr lang="en-US" dirty="0"/>
+              <a:t>Link to materials</a:t>
+            </a:r>
+          </a:p>
+        </p:txBody>
+      </p:sp>
+      <p:sp>
+        <p:nvSpPr>
+          <p:cNvPr id="3" name="Content Placeholder 2">
+            <a:extLst>
+              <a:ext uri="{FF2B5EF4-FFF2-40B4-BE49-F238E27FC236}">
+                <a16:creationId xmlns:a16="http://schemas.microsoft.com/office/drawing/2014/main" id="{0DD3AD29-29CF-3879-5538-708901248E1A}"/>
+              </a:ext>
+            </a:extLst>
+          </p:cNvPr>
+          <p:cNvSpPr>
+            <a:spLocks noGrp="1"/>
+          </p:cNvSpPr>
+          <p:nvPr>
+            <p:ph idx="1"/>
+          </p:nvPr>
+        </p:nvSpPr>
+        <p:spPr>
+          <a:xfrm>
+            <a:off x="609600" y="2438400"/>
+            <a:ext cx="10972800" cy="3687764"/>
+          </a:xfrm>
+        </p:spPr>
+        <p:txBody>
+          <a:bodyPr>
+            <a:normAutofit/>
+          </a:bodyPr>
+          <a:lstStyle/>
+          <a:p>
+            <a:pPr marL="0" indent="0" algn="ctr">
+              <a:buNone/>
+            </a:pPr>
+            <a:r>
+              <a:rPr lang="en-US" sz="3200" dirty="0"/>
+              <a:t>All slides and other materials are on </a:t>
+            </a:r>
+          </a:p>
+          <a:p>
+            <a:pPr algn="ctr"/>
+            <a:endParaRPr lang="en-US" sz="3200" dirty="0"/>
+          </a:p>
+          <a:p>
+            <a:pPr marL="0" indent="0" algn="ctr">
+              <a:buNone/>
+            </a:pPr>
+            <a:r>
+              <a:rPr lang="en-US" sz="3200" dirty="0">
+                <a:hlinkClick r:id="rId2"/>
+              </a:rPr>
+              <a:t>https://github.com/OHDSI/Tutorial-Hades</a:t>
+            </a:r>
+            <a:r>
+              <a:rPr lang="en-US" sz="3200" dirty="0"/>
+              <a:t> </a:t>
+            </a:r>
+          </a:p>
+        </p:txBody>
+      </p:sp>
+      <p:sp>
+        <p:nvSpPr>
+          <p:cNvPr id="4" name="Slide Number Placeholder 3">
+            <a:extLst>
+              <a:ext uri="{FF2B5EF4-FFF2-40B4-BE49-F238E27FC236}">
+                <a16:creationId xmlns:a16="http://schemas.microsoft.com/office/drawing/2014/main" id="{0D816DBD-D88E-8181-3899-D6578A7E3773}"/>
+              </a:ext>
+            </a:extLst>
+          </p:cNvPr>
+          <p:cNvSpPr>
+            <a:spLocks noGrp="1"/>
+          </p:cNvSpPr>
+          <p:nvPr>
+            <p:ph type="sldNum" sz="quarter" idx="4"/>
+          </p:nvPr>
+        </p:nvSpPr>
+        <p:spPr/>
+        <p:txBody>
+          <a:bodyPr/>
+          <a:lstStyle/>
+          <a:p>
+            <a:fld id="{444583ED-F364-40B3-B25B-483B5033DFA3}" type="slidenum">
+              <a:rPr lang="en-US" smtClean="0"/>
+              <a:pPr/>
+              <a:t>2</a:t>
+            </a:fld>
+            <a:endParaRPr lang="en-US"/>
+          </a:p>
+        </p:txBody>
+      </p:sp>
+    </p:spTree>
+    <p:extLst>
+      <p:ext uri="{BB962C8B-B14F-4D97-AF65-F5344CB8AC3E}">
+        <p14:creationId xmlns:p14="http://schemas.microsoft.com/office/powerpoint/2010/main" val="776812372"/>
+      </p:ext>
+    </p:extLst>
+  </p:cSld>
+  <p:clrMapOvr>
+    <a:masterClrMapping/>
+  </p:clrMapOvr>
+</p:sld>
+</file>
+
+<file path=ppt/slides/slide20.xml><?xml version="1.0" encoding="utf-8"?>
 <p:sld xmlns:a="http://schemas.openxmlformats.org/drawingml/2006/main" xmlns:r="http://schemas.openxmlformats.org/officeDocument/2006/relationships" xmlns:p="http://schemas.openxmlformats.org/presentationml/2006/main">
   <p:cSld>
     <p:spTree>
@@ -12936,7 +13677,7 @@
             <a:fld id="{444583ED-F364-40B3-B25B-483B5033DFA3}" type="slidenum">
               <a:rPr lang="en-US" smtClean="0"/>
               <a:pPr/>
-              <a:t>19</a:t>
+              <a:t>20</a:t>
             </a:fld>
             <a:endParaRPr lang="en-US"/>
           </a:p>
@@ -13075,152 +13816,7 @@
 </p:sld>
 </file>
 
-<file path=ppt/slides/slide2.xml><?xml version="1.0" encoding="utf-8"?>
-<p:sld xmlns:a="http://schemas.openxmlformats.org/drawingml/2006/main" xmlns:r="http://schemas.openxmlformats.org/officeDocument/2006/relationships" xmlns:p="http://schemas.openxmlformats.org/presentationml/2006/main">
-  <p:cSld>
-    <p:spTree>
-      <p:nvGrpSpPr>
-        <p:cNvPr id="1" name=""/>
-        <p:cNvGrpSpPr/>
-        <p:nvPr/>
-      </p:nvGrpSpPr>
-      <p:grpSpPr>
-        <a:xfrm>
-          <a:off x="0" y="0"/>
-          <a:ext cx="0" cy="0"/>
-          <a:chOff x="0" y="0"/>
-          <a:chExt cx="0" cy="0"/>
-        </a:xfrm>
-      </p:grpSpPr>
-      <p:sp>
-        <p:nvSpPr>
-          <p:cNvPr id="2" name="Title 1">
-            <a:extLst>
-              <a:ext uri="{FF2B5EF4-FFF2-40B4-BE49-F238E27FC236}">
-                <a16:creationId xmlns:a16="http://schemas.microsoft.com/office/drawing/2014/main" id="{FD61DFA2-E76E-53FE-FEFF-6B658CB7B136}"/>
-              </a:ext>
-            </a:extLst>
-          </p:cNvPr>
-          <p:cNvSpPr>
-            <a:spLocks noGrp="1"/>
-          </p:cNvSpPr>
-          <p:nvPr>
-            <p:ph type="title"/>
-          </p:nvPr>
-        </p:nvSpPr>
-        <p:spPr/>
-        <p:txBody>
-          <a:bodyPr/>
-          <a:lstStyle/>
-          <a:p>
-            <a:r>
-              <a:rPr lang="en-US" dirty="0"/>
-              <a:t>Link to materials</a:t>
-            </a:r>
-          </a:p>
-        </p:txBody>
-      </p:sp>
-      <p:sp>
-        <p:nvSpPr>
-          <p:cNvPr id="3" name="Content Placeholder 2">
-            <a:extLst>
-              <a:ext uri="{FF2B5EF4-FFF2-40B4-BE49-F238E27FC236}">
-                <a16:creationId xmlns:a16="http://schemas.microsoft.com/office/drawing/2014/main" id="{0DD3AD29-29CF-3879-5538-708901248E1A}"/>
-              </a:ext>
-            </a:extLst>
-          </p:cNvPr>
-          <p:cNvSpPr>
-            <a:spLocks noGrp="1"/>
-          </p:cNvSpPr>
-          <p:nvPr>
-            <p:ph idx="1"/>
-          </p:nvPr>
-        </p:nvSpPr>
-        <p:spPr>
-          <a:xfrm>
-            <a:off x="609600" y="2438400"/>
-            <a:ext cx="10972800" cy="3687764"/>
-          </a:xfrm>
-        </p:spPr>
-        <p:txBody>
-          <a:bodyPr>
-            <a:normAutofit/>
-          </a:bodyPr>
-          <a:lstStyle/>
-          <a:p>
-            <a:pPr marL="0" indent="0" algn="ctr">
-              <a:buNone/>
-            </a:pPr>
-            <a:r>
-              <a:rPr lang="en-US" sz="3200" dirty="0"/>
-              <a:t>All slides and other materials are on </a:t>
-            </a:r>
-          </a:p>
-          <a:p>
-            <a:pPr algn="ctr"/>
-            <a:endParaRPr lang="en-US" sz="3200" dirty="0"/>
-          </a:p>
-          <a:p>
-            <a:pPr marL="0" indent="0" algn="ctr">
-              <a:buNone/>
-            </a:pPr>
-            <a:r>
-              <a:rPr lang="en-US" sz="3200" dirty="0">
-                <a:hlinkClick r:id="rId2"/>
-              </a:rPr>
-              <a:t>https://github.com/OHDSI/Tutorial-Hades</a:t>
-            </a:r>
-            <a:r>
-              <a:rPr lang="en-US" sz="3200" dirty="0"/>
-              <a:t> </a:t>
-            </a:r>
-          </a:p>
-        </p:txBody>
-      </p:sp>
-      <p:sp>
-        <p:nvSpPr>
-          <p:cNvPr id="4" name="Slide Number Placeholder 3">
-            <a:extLst>
-              <a:ext uri="{FF2B5EF4-FFF2-40B4-BE49-F238E27FC236}">
-                <a16:creationId xmlns:a16="http://schemas.microsoft.com/office/drawing/2014/main" id="{0D816DBD-D88E-8181-3899-D6578A7E3773}"/>
-              </a:ext>
-            </a:extLst>
-          </p:cNvPr>
-          <p:cNvSpPr>
-            <a:spLocks noGrp="1"/>
-          </p:cNvSpPr>
-          <p:nvPr>
-            <p:ph type="sldNum" sz="quarter" idx="4"/>
-          </p:nvPr>
-        </p:nvSpPr>
-        <p:spPr/>
-        <p:txBody>
-          <a:bodyPr/>
-          <a:lstStyle/>
-          <a:p>
-            <a:fld id="{444583ED-F364-40B3-B25B-483B5033DFA3}" type="slidenum">
-              <a:rPr lang="en-US" smtClean="0"/>
-              <a:pPr/>
-              <a:t>2</a:t>
-            </a:fld>
-            <a:endParaRPr lang="en-US"/>
-          </a:p>
-        </p:txBody>
-      </p:sp>
-    </p:spTree>
-    <p:extLst>
-      <p:ext uri="{BB962C8B-B14F-4D97-AF65-F5344CB8AC3E}">
-        <p14:creationId xmlns:p14="http://schemas.microsoft.com/office/powerpoint/2010/main" val="776812372"/>
-      </p:ext>
-    </p:extLst>
-  </p:cSld>
-  <p:clrMapOvr>
-    <a:masterClrMapping/>
-  </p:clrMapOvr>
-</p:sld>
-</file>
-
-<file path=ppt/slides/slide20.xml><?xml version="1.0" encoding="utf-8"?>
+<file path=ppt/slides/slide21.xml><?xml version="1.0" encoding="utf-8"?>
 <p:sld xmlns:a="http://schemas.openxmlformats.org/drawingml/2006/main" xmlns:r="http://schemas.openxmlformats.org/officeDocument/2006/relationships" xmlns:p="http://schemas.openxmlformats.org/presentationml/2006/main">
   <p:cSld>
     <p:spTree>
@@ -13298,7 +13894,7 @@
             <a:fld id="{444583ED-F364-40B3-B25B-483B5033DFA3}" type="slidenum">
               <a:rPr lang="en-US" smtClean="0"/>
               <a:pPr algn="r"/>
-              <a:t>20</a:t>
+              <a:t>21</a:t>
             </a:fld>
             <a:endParaRPr lang="en-US" dirty="0"/>
           </a:p>
@@ -13333,166 +13929,6 @@
     <p:extLst>
       <p:ext uri="{BB962C8B-B14F-4D97-AF65-F5344CB8AC3E}">
         <p14:creationId xmlns:p14="http://schemas.microsoft.com/office/powerpoint/2010/main" val="2464938589"/>
-      </p:ext>
-    </p:extLst>
-  </p:cSld>
-  <p:clrMapOvr>
-    <a:masterClrMapping/>
-  </p:clrMapOvr>
-</p:sld>
-</file>
-
-<file path=ppt/slides/slide21.xml><?xml version="1.0" encoding="utf-8"?>
-<p:sld xmlns:a="http://schemas.openxmlformats.org/drawingml/2006/main" xmlns:r="http://schemas.openxmlformats.org/officeDocument/2006/relationships" xmlns:p="http://schemas.openxmlformats.org/presentationml/2006/main">
-  <p:cSld>
-    <p:spTree>
-      <p:nvGrpSpPr>
-        <p:cNvPr id="1" name=""/>
-        <p:cNvGrpSpPr/>
-        <p:nvPr/>
-      </p:nvGrpSpPr>
-      <p:grpSpPr>
-        <a:xfrm>
-          <a:off x="0" y="0"/>
-          <a:ext cx="0" cy="0"/>
-          <a:chOff x="0" y="0"/>
-          <a:chExt cx="0" cy="0"/>
-        </a:xfrm>
-      </p:grpSpPr>
-      <p:sp>
-        <p:nvSpPr>
-          <p:cNvPr id="2" name="Title 1">
-            <a:extLst>
-              <a:ext uri="{FF2B5EF4-FFF2-40B4-BE49-F238E27FC236}">
-                <a16:creationId xmlns:a16="http://schemas.microsoft.com/office/drawing/2014/main" id="{7116EA5F-0A47-4068-8FEF-61DA75F893DC}"/>
-              </a:ext>
-            </a:extLst>
-          </p:cNvPr>
-          <p:cNvSpPr>
-            <a:spLocks noGrp="1"/>
-          </p:cNvSpPr>
-          <p:nvPr>
-            <p:ph type="title"/>
-          </p:nvPr>
-        </p:nvSpPr>
-        <p:spPr/>
-        <p:txBody>
-          <a:bodyPr/>
-          <a:lstStyle/>
-          <a:p>
-            <a:r>
-              <a:rPr lang="en-US" dirty="0"/>
-              <a:t>Organization</a:t>
-            </a:r>
-          </a:p>
-        </p:txBody>
-      </p:sp>
-      <p:sp>
-        <p:nvSpPr>
-          <p:cNvPr id="3" name="Content Placeholder 2">
-            <a:extLst>
-              <a:ext uri="{FF2B5EF4-FFF2-40B4-BE49-F238E27FC236}">
-                <a16:creationId xmlns:a16="http://schemas.microsoft.com/office/drawing/2014/main" id="{C88DB8D1-241C-48D5-A843-95ECA68D1E55}"/>
-              </a:ext>
-            </a:extLst>
-          </p:cNvPr>
-          <p:cNvSpPr>
-            <a:spLocks noGrp="1"/>
-          </p:cNvSpPr>
-          <p:nvPr>
-            <p:ph idx="1"/>
-          </p:nvPr>
-        </p:nvSpPr>
-        <p:spPr/>
-        <p:txBody>
-          <a:bodyPr/>
-          <a:lstStyle/>
-          <a:p>
-            <a:r>
-              <a:rPr lang="en-US" dirty="0"/>
-              <a:t>Developer guidelines.</a:t>
-            </a:r>
-          </a:p>
-          <a:p>
-            <a:r>
-              <a:rPr lang="en-US" dirty="0"/>
-              <a:t>Code style guide.</a:t>
-            </a:r>
-          </a:p>
-          <a:p>
-            <a:r>
-              <a:rPr lang="en-US" dirty="0"/>
-              <a:t>Each package has 1 or 2 maintainers.</a:t>
-            </a:r>
-          </a:p>
-          <a:p>
-            <a:r>
-              <a:rPr lang="en-US" dirty="0"/>
-              <a:t>Monthly meetings (3</a:t>
-            </a:r>
-            <a:r>
-              <a:rPr lang="en-US" baseline="30000" dirty="0"/>
-              <a:t>rd</a:t>
-            </a:r>
-            <a:r>
-              <a:rPr lang="en-US" dirty="0"/>
-              <a:t> Thursday of the month, at noon Eastern Time)</a:t>
-            </a:r>
-          </a:p>
-          <a:p>
-            <a:r>
-              <a:rPr lang="en-US" dirty="0"/>
-              <a:t>Discussions on forums, Teams channel, issue trackers.</a:t>
-            </a:r>
-          </a:p>
-          <a:p>
-            <a:r>
-              <a:rPr lang="en-US" dirty="0"/>
-              <a:t>Bi-weekly open-source community calls (Wednesdays, at 11am Eastern Time).</a:t>
-            </a:r>
-          </a:p>
-          <a:p>
-            <a:endParaRPr lang="en-US" dirty="0"/>
-          </a:p>
-          <a:p>
-            <a:endParaRPr lang="en-US" dirty="0"/>
-          </a:p>
-        </p:txBody>
-      </p:sp>
-      <p:sp>
-        <p:nvSpPr>
-          <p:cNvPr id="4" name="Slide Number Placeholder 3">
-            <a:extLst>
-              <a:ext uri="{FF2B5EF4-FFF2-40B4-BE49-F238E27FC236}">
-                <a16:creationId xmlns:a16="http://schemas.microsoft.com/office/drawing/2014/main" id="{30DE7B42-5CED-4CE6-8EA5-B3B8FC2176F3}"/>
-              </a:ext>
-            </a:extLst>
-          </p:cNvPr>
-          <p:cNvSpPr>
-            <a:spLocks noGrp="1"/>
-          </p:cNvSpPr>
-          <p:nvPr>
-            <p:ph type="sldNum" sz="quarter" idx="4"/>
-          </p:nvPr>
-        </p:nvSpPr>
-        <p:spPr/>
-        <p:txBody>
-          <a:bodyPr/>
-          <a:lstStyle/>
-          <a:p>
-            <a:fld id="{444583ED-F364-40B3-B25B-483B5033DFA3}" type="slidenum">
-              <a:rPr lang="en-US" smtClean="0"/>
-              <a:pPr/>
-              <a:t>21</a:t>
-            </a:fld>
-            <a:endParaRPr lang="en-US"/>
-          </a:p>
-        </p:txBody>
-      </p:sp>
-    </p:spTree>
-    <p:extLst>
-      <p:ext uri="{BB962C8B-B14F-4D97-AF65-F5344CB8AC3E}">
-        <p14:creationId xmlns:p14="http://schemas.microsoft.com/office/powerpoint/2010/main" val="894888374"/>
       </p:ext>
     </p:extLst>
   </p:cSld>
@@ -13524,7 +13960,7 @@
           <p:cNvPr id="2" name="Title 1">
             <a:extLst>
               <a:ext uri="{FF2B5EF4-FFF2-40B4-BE49-F238E27FC236}">
-                <a16:creationId xmlns:a16="http://schemas.microsoft.com/office/drawing/2014/main" id="{2AC4D0E6-6C95-42EC-8736-F8AFE35CA0E5}"/>
+                <a16:creationId xmlns:a16="http://schemas.microsoft.com/office/drawing/2014/main" id="{7116EA5F-0A47-4068-8FEF-61DA75F893DC}"/>
               </a:ext>
             </a:extLst>
           </p:cNvPr>
@@ -13542,7 +13978,7 @@
           <a:p>
             <a:r>
               <a:rPr lang="en-US" dirty="0"/>
-              <a:t>Continuous integration</a:t>
+              <a:t>Organization</a:t>
             </a:r>
           </a:p>
         </p:txBody>
@@ -13552,7 +13988,7 @@
           <p:cNvPr id="3" name="Content Placeholder 2">
             <a:extLst>
               <a:ext uri="{FF2B5EF4-FFF2-40B4-BE49-F238E27FC236}">
-                <a16:creationId xmlns:a16="http://schemas.microsoft.com/office/drawing/2014/main" id="{AE2A89E2-81EA-4AC2-AD8C-AFEE2D88896C}"/>
+                <a16:creationId xmlns:a16="http://schemas.microsoft.com/office/drawing/2014/main" id="{C88DB8D1-241C-48D5-A843-95ECA68D1E55}"/>
               </a:ext>
             </a:extLst>
           </p:cNvPr>
@@ -13568,37 +14004,54 @@
           <a:bodyPr/>
           <a:lstStyle/>
           <a:p>
-            <a:pPr marL="0" indent="0">
-              <a:buNone/>
-            </a:pPr>
             <a:r>
               <a:rPr lang="en-US" dirty="0"/>
-              <a:t>At each push to GitHub</a:t>
+              <a:t>Developer guidelines.</a:t>
             </a:r>
           </a:p>
           <a:p>
             <a:r>
               <a:rPr lang="en-US" dirty="0"/>
-              <a:t>Run R Check on Windows, MacOS, and Linux</a:t>
+              <a:t>Code style guide.</a:t>
             </a:r>
           </a:p>
           <a:p>
             <a:r>
               <a:rPr lang="en-US" dirty="0"/>
-              <a:t>Unit tests can use a set of database servers (SQL Server, PostgreSQL, Oracle, RedShift, Spark, …)</a:t>
+              <a:t>Each package has 1 or 2 maintainers.</a:t>
             </a:r>
           </a:p>
           <a:p>
             <a:r>
               <a:rPr lang="en-US" dirty="0"/>
-              <a:t>Compute code coverage</a:t>
-            </a:r>
-          </a:p>
-          <a:p>
+              <a:t>Monthly meetings (3</a:t>
+            </a:r>
+            <a:r>
+              <a:rPr lang="en-US" baseline="30000" dirty="0"/>
+              <a:t>rd</a:t>
+            </a:r>
             <a:r>
               <a:rPr lang="en-US" dirty="0"/>
-              <a:t>If push to main branch and higher version in DESCRIPTION, create release</a:t>
-            </a:r>
+              <a:t> Thursday of the month, at noon Eastern Time)</a:t>
+            </a:r>
+          </a:p>
+          <a:p>
+            <a:r>
+              <a:rPr lang="en-US" dirty="0"/>
+              <a:t>Discussions on forums, Teams channel, issue trackers.</a:t>
+            </a:r>
+          </a:p>
+          <a:p>
+            <a:r>
+              <a:rPr lang="en-US" dirty="0"/>
+              <a:t>Bi-weekly open-source community calls (Wednesdays, at 11am Eastern Time).</a:t>
+            </a:r>
+          </a:p>
+          <a:p>
+            <a:endParaRPr lang="en-US" dirty="0"/>
+          </a:p>
+          <a:p>
+            <a:endParaRPr lang="en-US" dirty="0"/>
           </a:p>
         </p:txBody>
       </p:sp>
@@ -13607,7 +14060,7 @@
           <p:cNvPr id="4" name="Slide Number Placeholder 3">
             <a:extLst>
               <a:ext uri="{FF2B5EF4-FFF2-40B4-BE49-F238E27FC236}">
-                <a16:creationId xmlns:a16="http://schemas.microsoft.com/office/drawing/2014/main" id="{A33ED9DD-4FC7-4D4C-84F2-9361E0C741AB}"/>
+                <a16:creationId xmlns:a16="http://schemas.microsoft.com/office/drawing/2014/main" id="{30DE7B42-5CED-4CE6-8EA5-B3B8FC2176F3}"/>
               </a:ext>
             </a:extLst>
           </p:cNvPr>
@@ -13627,6 +14080,149 @@
               <a:rPr lang="en-US" smtClean="0"/>
               <a:pPr/>
               <a:t>22</a:t>
+            </a:fld>
+            <a:endParaRPr lang="en-US"/>
+          </a:p>
+        </p:txBody>
+      </p:sp>
+    </p:spTree>
+    <p:extLst>
+      <p:ext uri="{BB962C8B-B14F-4D97-AF65-F5344CB8AC3E}">
+        <p14:creationId xmlns:p14="http://schemas.microsoft.com/office/powerpoint/2010/main" val="894888374"/>
+      </p:ext>
+    </p:extLst>
+  </p:cSld>
+  <p:clrMapOvr>
+    <a:masterClrMapping/>
+  </p:clrMapOvr>
+</p:sld>
+</file>
+
+<file path=ppt/slides/slide23.xml><?xml version="1.0" encoding="utf-8"?>
+<p:sld xmlns:a="http://schemas.openxmlformats.org/drawingml/2006/main" xmlns:r="http://schemas.openxmlformats.org/officeDocument/2006/relationships" xmlns:p="http://schemas.openxmlformats.org/presentationml/2006/main">
+  <p:cSld>
+    <p:spTree>
+      <p:nvGrpSpPr>
+        <p:cNvPr id="1" name=""/>
+        <p:cNvGrpSpPr/>
+        <p:nvPr/>
+      </p:nvGrpSpPr>
+      <p:grpSpPr>
+        <a:xfrm>
+          <a:off x="0" y="0"/>
+          <a:ext cx="0" cy="0"/>
+          <a:chOff x="0" y="0"/>
+          <a:chExt cx="0" cy="0"/>
+        </a:xfrm>
+      </p:grpSpPr>
+      <p:sp>
+        <p:nvSpPr>
+          <p:cNvPr id="2" name="Title 1">
+            <a:extLst>
+              <a:ext uri="{FF2B5EF4-FFF2-40B4-BE49-F238E27FC236}">
+                <a16:creationId xmlns:a16="http://schemas.microsoft.com/office/drawing/2014/main" id="{2AC4D0E6-6C95-42EC-8736-F8AFE35CA0E5}"/>
+              </a:ext>
+            </a:extLst>
+          </p:cNvPr>
+          <p:cNvSpPr>
+            <a:spLocks noGrp="1"/>
+          </p:cNvSpPr>
+          <p:nvPr>
+            <p:ph type="title"/>
+          </p:nvPr>
+        </p:nvSpPr>
+        <p:spPr/>
+        <p:txBody>
+          <a:bodyPr/>
+          <a:lstStyle/>
+          <a:p>
+            <a:r>
+              <a:rPr lang="en-US" dirty="0"/>
+              <a:t>Continuous integration</a:t>
+            </a:r>
+          </a:p>
+        </p:txBody>
+      </p:sp>
+      <p:sp>
+        <p:nvSpPr>
+          <p:cNvPr id="3" name="Content Placeholder 2">
+            <a:extLst>
+              <a:ext uri="{FF2B5EF4-FFF2-40B4-BE49-F238E27FC236}">
+                <a16:creationId xmlns:a16="http://schemas.microsoft.com/office/drawing/2014/main" id="{AE2A89E2-81EA-4AC2-AD8C-AFEE2D88896C}"/>
+              </a:ext>
+            </a:extLst>
+          </p:cNvPr>
+          <p:cNvSpPr>
+            <a:spLocks noGrp="1"/>
+          </p:cNvSpPr>
+          <p:nvPr>
+            <p:ph idx="1"/>
+          </p:nvPr>
+        </p:nvSpPr>
+        <p:spPr/>
+        <p:txBody>
+          <a:bodyPr/>
+          <a:lstStyle/>
+          <a:p>
+            <a:pPr marL="0" indent="0">
+              <a:buNone/>
+            </a:pPr>
+            <a:r>
+              <a:rPr lang="en-US" dirty="0"/>
+              <a:t>At each push to GitHub</a:t>
+            </a:r>
+          </a:p>
+          <a:p>
+            <a:r>
+              <a:rPr lang="en-US" dirty="0"/>
+              <a:t>Run R Check on Windows, MacOS, and Linux</a:t>
+            </a:r>
+          </a:p>
+          <a:p>
+            <a:r>
+              <a:rPr lang="en-US" dirty="0"/>
+              <a:t>Unit tests can use a set of database servers (SQL Server, PostgreSQL, Oracle, RedShift, Spark, …)</a:t>
+            </a:r>
+          </a:p>
+          <a:p>
+            <a:r>
+              <a:rPr lang="en-US" dirty="0"/>
+              <a:t>Compute code coverage</a:t>
+            </a:r>
+          </a:p>
+          <a:p>
+            <a:r>
+              <a:rPr lang="en-US" dirty="0"/>
+              <a:t>If push to main branch and higher version in DESCRIPTION, create release</a:t>
+            </a:r>
+          </a:p>
+        </p:txBody>
+      </p:sp>
+      <p:sp>
+        <p:nvSpPr>
+          <p:cNvPr id="4" name="Slide Number Placeholder 3">
+            <a:extLst>
+              <a:ext uri="{FF2B5EF4-FFF2-40B4-BE49-F238E27FC236}">
+                <a16:creationId xmlns:a16="http://schemas.microsoft.com/office/drawing/2014/main" id="{A33ED9DD-4FC7-4D4C-84F2-9361E0C741AB}"/>
+              </a:ext>
+            </a:extLst>
+          </p:cNvPr>
+          <p:cNvSpPr>
+            <a:spLocks noGrp="1"/>
+          </p:cNvSpPr>
+          <p:nvPr>
+            <p:ph type="sldNum" sz="quarter" idx="4"/>
+          </p:nvPr>
+        </p:nvSpPr>
+        <p:spPr/>
+        <p:txBody>
+          <a:bodyPr/>
+          <a:lstStyle/>
+          <a:p>
+            <a:fld id="{444583ED-F364-40B3-B25B-483B5033DFA3}" type="slidenum">
+              <a:rPr lang="en-US" smtClean="0"/>
+              <a:pPr/>
+              <a:t>23</a:t>
             </a:fld>
             <a:endParaRPr lang="en-US"/>
           </a:p>
@@ -13923,7 +14519,7 @@
 </p:sld>
 </file>
 
-<file path=ppt/slides/slide23.xml><?xml version="1.0" encoding="utf-8"?>
+<file path=ppt/slides/slide24.xml><?xml version="1.0" encoding="utf-8"?>
 <p:sld xmlns:a="http://schemas.openxmlformats.org/drawingml/2006/main" xmlns:r="http://schemas.openxmlformats.org/officeDocument/2006/relationships" xmlns:p="http://schemas.openxmlformats.org/presentationml/2006/main">
   <p:cSld>
     <p:spTree>
@@ -14851,7 +15447,7 @@
             <a:fld id="{444583ED-F364-40B3-B25B-483B5033DFA3}" type="slidenum">
               <a:rPr lang="en-US" smtClean="0"/>
               <a:pPr/>
-              <a:t>23</a:t>
+              <a:t>24</a:t>
             </a:fld>
             <a:endParaRPr lang="en-US"/>
           </a:p>
@@ -15603,153 +16199,6 @@
 </p:sld>
 </file>
 
-<file path=ppt/slides/slide24.xml><?xml version="1.0" encoding="utf-8"?>
-<p:sld xmlns:a="http://schemas.openxmlformats.org/drawingml/2006/main" xmlns:r="http://schemas.openxmlformats.org/officeDocument/2006/relationships" xmlns:p="http://schemas.openxmlformats.org/presentationml/2006/main">
-  <p:cSld>
-    <p:spTree>
-      <p:nvGrpSpPr>
-        <p:cNvPr id="1" name=""/>
-        <p:cNvGrpSpPr/>
-        <p:nvPr/>
-      </p:nvGrpSpPr>
-      <p:grpSpPr>
-        <a:xfrm>
-          <a:off x="0" y="0"/>
-          <a:ext cx="0" cy="0"/>
-          <a:chOff x="0" y="0"/>
-          <a:chExt cx="0" cy="0"/>
-        </a:xfrm>
-      </p:grpSpPr>
-      <p:sp>
-        <p:nvSpPr>
-          <p:cNvPr id="2" name="Title 1">
-            <a:extLst>
-              <a:ext uri="{FF2B5EF4-FFF2-40B4-BE49-F238E27FC236}">
-                <a16:creationId xmlns:a16="http://schemas.microsoft.com/office/drawing/2014/main" id="{14883754-568D-46AC-ACD1-B55D79BC637C}"/>
-              </a:ext>
-            </a:extLst>
-          </p:cNvPr>
-          <p:cNvSpPr>
-            <a:spLocks noGrp="1"/>
-          </p:cNvSpPr>
-          <p:nvPr>
-            <p:ph type="title"/>
-          </p:nvPr>
-        </p:nvSpPr>
-        <p:spPr/>
-        <p:txBody>
-          <a:bodyPr/>
-          <a:lstStyle/>
-          <a:p>
-            <a:r>
-              <a:rPr lang="en-US" dirty="0"/>
-              <a:t>CRAN</a:t>
-            </a:r>
-          </a:p>
-        </p:txBody>
-      </p:sp>
-      <p:sp>
-        <p:nvSpPr>
-          <p:cNvPr id="3" name="Content Placeholder 2">
-            <a:extLst>
-              <a:ext uri="{FF2B5EF4-FFF2-40B4-BE49-F238E27FC236}">
-                <a16:creationId xmlns:a16="http://schemas.microsoft.com/office/drawing/2014/main" id="{692AB775-47F0-4114-BD91-8E0C82E9CB6E}"/>
-              </a:ext>
-            </a:extLst>
-          </p:cNvPr>
-          <p:cNvSpPr>
-            <a:spLocks noGrp="1"/>
-          </p:cNvSpPr>
-          <p:nvPr>
-            <p:ph idx="1"/>
-          </p:nvPr>
-        </p:nvSpPr>
-        <p:spPr/>
-        <p:txBody>
-          <a:bodyPr/>
-          <a:lstStyle/>
-          <a:p>
-            <a:r>
-              <a:rPr lang="en-US" dirty="0"/>
-              <a:t>Some HADES packages are in CRAN for easier install</a:t>
-            </a:r>
-          </a:p>
-          <a:p>
-            <a:r>
-              <a:rPr lang="en-US" dirty="0"/>
-              <a:t>Getting things in CRAN is hard, because</a:t>
-            </a:r>
-          </a:p>
-          <a:p>
-            <a:pPr lvl="1"/>
-            <a:r>
-              <a:rPr lang="en-US" dirty="0"/>
-              <a:t>Package size &lt;7mb</a:t>
-            </a:r>
-          </a:p>
-          <a:p>
-            <a:pPr lvl="1"/>
-            <a:r>
-              <a:rPr lang="en-US" dirty="0"/>
-              <a:t>Cannot use database testing servers, but also not allowed not to have running examples / unit tests.</a:t>
-            </a:r>
-          </a:p>
-          <a:p>
-            <a:pPr lvl="1"/>
-            <a:r>
-              <a:rPr lang="en-US" dirty="0"/>
-              <a:t>CRAN requires code runs on really old platforms (e.g. Java 1.5, Solaris)</a:t>
-            </a:r>
-          </a:p>
-          <a:p>
-            <a:pPr lvl="1"/>
-            <a:endParaRPr lang="en-US" dirty="0"/>
-          </a:p>
-        </p:txBody>
-      </p:sp>
-      <p:sp>
-        <p:nvSpPr>
-          <p:cNvPr id="4" name="Slide Number Placeholder 3">
-            <a:extLst>
-              <a:ext uri="{FF2B5EF4-FFF2-40B4-BE49-F238E27FC236}">
-                <a16:creationId xmlns:a16="http://schemas.microsoft.com/office/drawing/2014/main" id="{D7F98DF1-D0CE-444F-96D8-438D6D004240}"/>
-              </a:ext>
-            </a:extLst>
-          </p:cNvPr>
-          <p:cNvSpPr>
-            <a:spLocks noGrp="1"/>
-          </p:cNvSpPr>
-          <p:nvPr>
-            <p:ph type="sldNum" sz="quarter" idx="4"/>
-          </p:nvPr>
-        </p:nvSpPr>
-        <p:spPr/>
-        <p:txBody>
-          <a:bodyPr/>
-          <a:lstStyle/>
-          <a:p>
-            <a:fld id="{444583ED-F364-40B3-B25B-483B5033DFA3}" type="slidenum">
-              <a:rPr lang="en-US" smtClean="0"/>
-              <a:pPr/>
-              <a:t>24</a:t>
-            </a:fld>
-            <a:endParaRPr lang="en-US"/>
-          </a:p>
-        </p:txBody>
-      </p:sp>
-    </p:spTree>
-    <p:extLst>
-      <p:ext uri="{BB962C8B-B14F-4D97-AF65-F5344CB8AC3E}">
-        <p14:creationId xmlns:p14="http://schemas.microsoft.com/office/powerpoint/2010/main" val="1906594612"/>
-      </p:ext>
-    </p:extLst>
-  </p:cSld>
-  <p:clrMapOvr>
-    <a:masterClrMapping/>
-  </p:clrMapOvr>
-</p:sld>
-</file>
-
 <file path=ppt/slides/slide25.xml><?xml version="1.0" encoding="utf-8"?>
 <p:sld xmlns:a="http://schemas.openxmlformats.org/drawingml/2006/main" xmlns:r="http://schemas.openxmlformats.org/officeDocument/2006/relationships" xmlns:p="http://schemas.openxmlformats.org/presentationml/2006/main">
   <p:cSld>
@@ -15772,7 +16221,7 @@
           <p:cNvPr id="2" name="Title 1">
             <a:extLst>
               <a:ext uri="{FF2B5EF4-FFF2-40B4-BE49-F238E27FC236}">
-                <a16:creationId xmlns:a16="http://schemas.microsoft.com/office/drawing/2014/main" id="{6CC6FD2E-32EF-C0C6-A693-D51DF9CDE460}"/>
+                <a16:creationId xmlns:a16="http://schemas.microsoft.com/office/drawing/2014/main" id="{14883754-568D-46AC-ACD1-B55D79BC637C}"/>
               </a:ext>
             </a:extLst>
           </p:cNvPr>
@@ -15790,7 +16239,7 @@
           <a:p>
             <a:r>
               <a:rPr lang="en-US" dirty="0"/>
-              <a:t>HADES-wide release</a:t>
+              <a:t>CRAN</a:t>
             </a:r>
           </a:p>
         </p:txBody>
@@ -15800,7 +16249,7 @@
           <p:cNvPr id="3" name="Content Placeholder 2">
             <a:extLst>
               <a:ext uri="{FF2B5EF4-FFF2-40B4-BE49-F238E27FC236}">
-                <a16:creationId xmlns:a16="http://schemas.microsoft.com/office/drawing/2014/main" id="{632AFB67-F446-AC12-3A55-2395700966C6}"/>
+                <a16:creationId xmlns:a16="http://schemas.microsoft.com/office/drawing/2014/main" id="{692AB775-47F0-4114-BD91-8E0C82E9CB6E}"/>
               </a:ext>
             </a:extLst>
           </p:cNvPr>
@@ -15818,22 +16267,39 @@
           <a:p>
             <a:r>
               <a:rPr lang="en-US" dirty="0"/>
-              <a:t>HADES-wide release twice a year</a:t>
+              <a:t>Some HADES packages are in CRAN for easier install</a:t>
             </a:r>
           </a:p>
           <a:p>
             <a:r>
               <a:rPr lang="en-US" dirty="0"/>
-              <a:t>Currently available as </a:t>
-            </a:r>
-            <a:r>
-              <a:rPr lang="en-US" dirty="0" err="1"/>
-              <a:t>renv</a:t>
-            </a:r>
+              <a:t>Getting things in CRAN is hard, because</a:t>
+            </a:r>
+          </a:p>
+          <a:p>
+            <a:pPr lvl="1"/>
             <a:r>
               <a:rPr lang="en-US" dirty="0"/>
-              <a:t> lock file, hopefully as Docker container starting next release</a:t>
-            </a:r>
+              <a:t>Package size &lt;7mb</a:t>
+            </a:r>
+          </a:p>
+          <a:p>
+            <a:pPr lvl="1"/>
+            <a:r>
+              <a:rPr lang="en-US" dirty="0"/>
+              <a:t>Cannot use database testing servers, but also not allowed not to have running examples / unit tests.</a:t>
+            </a:r>
+          </a:p>
+          <a:p>
+            <a:pPr lvl="1"/>
+            <a:r>
+              <a:rPr lang="en-US" dirty="0"/>
+              <a:t>CRAN requires code runs on really old platforms (e.g. Java 1.5, Solaris)</a:t>
+            </a:r>
+          </a:p>
+          <a:p>
+            <a:pPr lvl="1"/>
+            <a:endParaRPr lang="en-US" dirty="0"/>
           </a:p>
         </p:txBody>
       </p:sp>
@@ -15842,7 +16308,7 @@
           <p:cNvPr id="4" name="Slide Number Placeholder 3">
             <a:extLst>
               <a:ext uri="{FF2B5EF4-FFF2-40B4-BE49-F238E27FC236}">
-                <a16:creationId xmlns:a16="http://schemas.microsoft.com/office/drawing/2014/main" id="{CB67C5C1-0505-16D2-3658-D453193083A6}"/>
+                <a16:creationId xmlns:a16="http://schemas.microsoft.com/office/drawing/2014/main" id="{D7F98DF1-D0CE-444F-96D8-438D6D004240}"/>
               </a:ext>
             </a:extLst>
           </p:cNvPr>
@@ -15862,6 +16328,136 @@
               <a:rPr lang="en-US" smtClean="0"/>
               <a:pPr/>
               <a:t>25</a:t>
+            </a:fld>
+            <a:endParaRPr lang="en-US"/>
+          </a:p>
+        </p:txBody>
+      </p:sp>
+    </p:spTree>
+    <p:extLst>
+      <p:ext uri="{BB962C8B-B14F-4D97-AF65-F5344CB8AC3E}">
+        <p14:creationId xmlns:p14="http://schemas.microsoft.com/office/powerpoint/2010/main" val="1906594612"/>
+      </p:ext>
+    </p:extLst>
+  </p:cSld>
+  <p:clrMapOvr>
+    <a:masterClrMapping/>
+  </p:clrMapOvr>
+</p:sld>
+</file>
+
+<file path=ppt/slides/slide26.xml><?xml version="1.0" encoding="utf-8"?>
+<p:sld xmlns:a="http://schemas.openxmlformats.org/drawingml/2006/main" xmlns:r="http://schemas.openxmlformats.org/officeDocument/2006/relationships" xmlns:p="http://schemas.openxmlformats.org/presentationml/2006/main">
+  <p:cSld>
+    <p:spTree>
+      <p:nvGrpSpPr>
+        <p:cNvPr id="1" name=""/>
+        <p:cNvGrpSpPr/>
+        <p:nvPr/>
+      </p:nvGrpSpPr>
+      <p:grpSpPr>
+        <a:xfrm>
+          <a:off x="0" y="0"/>
+          <a:ext cx="0" cy="0"/>
+          <a:chOff x="0" y="0"/>
+          <a:chExt cx="0" cy="0"/>
+        </a:xfrm>
+      </p:grpSpPr>
+      <p:sp>
+        <p:nvSpPr>
+          <p:cNvPr id="2" name="Title 1">
+            <a:extLst>
+              <a:ext uri="{FF2B5EF4-FFF2-40B4-BE49-F238E27FC236}">
+                <a16:creationId xmlns:a16="http://schemas.microsoft.com/office/drawing/2014/main" id="{6CC6FD2E-32EF-C0C6-A693-D51DF9CDE460}"/>
+              </a:ext>
+            </a:extLst>
+          </p:cNvPr>
+          <p:cNvSpPr>
+            <a:spLocks noGrp="1"/>
+          </p:cNvSpPr>
+          <p:nvPr>
+            <p:ph type="title"/>
+          </p:nvPr>
+        </p:nvSpPr>
+        <p:spPr/>
+        <p:txBody>
+          <a:bodyPr/>
+          <a:lstStyle/>
+          <a:p>
+            <a:r>
+              <a:rPr lang="en-US" dirty="0"/>
+              <a:t>HADES-wide release</a:t>
+            </a:r>
+          </a:p>
+        </p:txBody>
+      </p:sp>
+      <p:sp>
+        <p:nvSpPr>
+          <p:cNvPr id="3" name="Content Placeholder 2">
+            <a:extLst>
+              <a:ext uri="{FF2B5EF4-FFF2-40B4-BE49-F238E27FC236}">
+                <a16:creationId xmlns:a16="http://schemas.microsoft.com/office/drawing/2014/main" id="{632AFB67-F446-AC12-3A55-2395700966C6}"/>
+              </a:ext>
+            </a:extLst>
+          </p:cNvPr>
+          <p:cNvSpPr>
+            <a:spLocks noGrp="1"/>
+          </p:cNvSpPr>
+          <p:nvPr>
+            <p:ph idx="1"/>
+          </p:nvPr>
+        </p:nvSpPr>
+        <p:spPr/>
+        <p:txBody>
+          <a:bodyPr/>
+          <a:lstStyle/>
+          <a:p>
+            <a:r>
+              <a:rPr lang="en-US" dirty="0"/>
+              <a:t>HADES-wide release twice a year</a:t>
+            </a:r>
+          </a:p>
+          <a:p>
+            <a:r>
+              <a:rPr lang="en-US" dirty="0"/>
+              <a:t>Currently available as </a:t>
+            </a:r>
+            <a:r>
+              <a:rPr lang="en-US" dirty="0" err="1"/>
+              <a:t>renv</a:t>
+            </a:r>
+            <a:r>
+              <a:rPr lang="en-US" dirty="0"/>
+              <a:t> lock file, hopefully as Docker container starting next release</a:t>
+            </a:r>
+          </a:p>
+        </p:txBody>
+      </p:sp>
+      <p:sp>
+        <p:nvSpPr>
+          <p:cNvPr id="4" name="Slide Number Placeholder 3">
+            <a:extLst>
+              <a:ext uri="{FF2B5EF4-FFF2-40B4-BE49-F238E27FC236}">
+                <a16:creationId xmlns:a16="http://schemas.microsoft.com/office/drawing/2014/main" id="{CB67C5C1-0505-16D2-3658-D453193083A6}"/>
+              </a:ext>
+            </a:extLst>
+          </p:cNvPr>
+          <p:cNvSpPr>
+            <a:spLocks noGrp="1"/>
+          </p:cNvSpPr>
+          <p:nvPr>
+            <p:ph type="sldNum" sz="quarter" idx="4"/>
+          </p:nvPr>
+        </p:nvSpPr>
+        <p:spPr/>
+        <p:txBody>
+          <a:bodyPr/>
+          <a:lstStyle/>
+          <a:p>
+            <a:fld id="{444583ED-F364-40B3-B25B-483B5033DFA3}" type="slidenum">
+              <a:rPr lang="en-US" smtClean="0"/>
+              <a:pPr/>
+              <a:t>26</a:t>
             </a:fld>
             <a:endParaRPr lang="en-US"/>
           </a:p>
@@ -21722,7 +22318,7 @@
 </p:sld>
 </file>
 
-<file path=ppt/slides/slide26.xml><?xml version="1.0" encoding="utf-8"?>
+<file path=ppt/slides/slide27.xml><?xml version="1.0" encoding="utf-8"?>
 <p:sld xmlns:a="http://schemas.openxmlformats.org/drawingml/2006/main" xmlns:r="http://schemas.openxmlformats.org/officeDocument/2006/relationships" xmlns:p="http://schemas.openxmlformats.org/presentationml/2006/main">
   <p:cSld>
     <p:spTree>
@@ -21800,7 +22396,7 @@
             <a:fld id="{444583ED-F364-40B3-B25B-483B5033DFA3}" type="slidenum">
               <a:rPr lang="en-US" smtClean="0"/>
               <a:pPr algn="r"/>
-              <a:t>26</a:t>
+              <a:t>27</a:t>
             </a:fld>
             <a:endParaRPr lang="en-US" dirty="0"/>
           </a:p>
@@ -21844,7 +22440,7 @@
 </p:sld>
 </file>
 
-<file path=ppt/slides/slide27.xml><?xml version="1.0" encoding="utf-8"?>
+<file path=ppt/slides/slide28.xml><?xml version="1.0" encoding="utf-8"?>
 <p:sld xmlns:a="http://schemas.openxmlformats.org/drawingml/2006/main" xmlns:r="http://schemas.openxmlformats.org/officeDocument/2006/relationships" xmlns:p="http://schemas.openxmlformats.org/presentationml/2006/main">
   <p:cSld>
     <p:spTree>
@@ -21968,7 +22564,7 @@
             <a:fld id="{444583ED-F364-40B3-B25B-483B5033DFA3}" type="slidenum">
               <a:rPr lang="en-US" smtClean="0"/>
               <a:pPr/>
-              <a:t>27</a:t>
+              <a:t>28</a:t>
             </a:fld>
             <a:endParaRPr lang="en-US"/>
           </a:p>
@@ -22216,7 +22812,7 @@
 </p:sld>
 </file>
 
-<file path=ppt/slides/slide28.xml><?xml version="1.0" encoding="utf-8"?>
+<file path=ppt/slides/slide29.xml><?xml version="1.0" encoding="utf-8"?>
 <p:sld xmlns:a="http://schemas.openxmlformats.org/drawingml/2006/main" xmlns:r="http://schemas.openxmlformats.org/officeDocument/2006/relationships" xmlns:p="http://schemas.openxmlformats.org/presentationml/2006/main">
   <p:cSld>
     <p:spTree>
@@ -22431,7 +23027,7 @@
             <a:fld id="{444583ED-F364-40B3-B25B-483B5033DFA3}" type="slidenum">
               <a:rPr lang="en-US" smtClean="0"/>
               <a:pPr/>
-              <a:t>28</a:t>
+              <a:t>29</a:t>
             </a:fld>
             <a:endParaRPr lang="en-US"/>
           </a:p>
@@ -25304,369 +25900,6 @@
   <p:clrMapOvr>
     <a:masterClrMapping/>
   </p:clrMapOvr>
-</p:sld>
-</file>
-
-<file path=ppt/slides/slide29.xml><?xml version="1.0" encoding="utf-8"?>
-<p:sld xmlns:a="http://schemas.openxmlformats.org/drawingml/2006/main" xmlns:r="http://schemas.openxmlformats.org/officeDocument/2006/relationships" xmlns:p="http://schemas.openxmlformats.org/presentationml/2006/main">
-  <p:cSld>
-    <p:spTree>
-      <p:nvGrpSpPr>
-        <p:cNvPr id="1" name=""/>
-        <p:cNvGrpSpPr/>
-        <p:nvPr/>
-      </p:nvGrpSpPr>
-      <p:grpSpPr>
-        <a:xfrm>
-          <a:off x="0" y="0"/>
-          <a:ext cx="0" cy="0"/>
-          <a:chOff x="0" y="0"/>
-          <a:chExt cx="0" cy="0"/>
-        </a:xfrm>
-      </p:grpSpPr>
-      <p:sp>
-        <p:nvSpPr>
-          <p:cNvPr id="2" name="Title 1">
-            <a:extLst>
-              <a:ext uri="{FF2B5EF4-FFF2-40B4-BE49-F238E27FC236}">
-                <a16:creationId xmlns:a16="http://schemas.microsoft.com/office/drawing/2014/main" id="{1DF5F88C-624F-08DC-8C51-866A8FC78C74}"/>
-              </a:ext>
-            </a:extLst>
-          </p:cNvPr>
-          <p:cNvSpPr>
-            <a:spLocks noGrp="1"/>
-          </p:cNvSpPr>
-          <p:nvPr>
-            <p:ph type="title"/>
-          </p:nvPr>
-        </p:nvSpPr>
-        <p:spPr/>
-        <p:txBody>
-          <a:bodyPr/>
-          <a:lstStyle/>
-          <a:p>
-            <a:r>
-              <a:rPr lang="en-US" dirty="0"/>
-              <a:t>Conclusions</a:t>
-            </a:r>
-          </a:p>
-        </p:txBody>
-      </p:sp>
-      <p:sp>
-        <p:nvSpPr>
-          <p:cNvPr id="3" name="Content Placeholder 2">
-            <a:extLst>
-              <a:ext uri="{FF2B5EF4-FFF2-40B4-BE49-F238E27FC236}">
-                <a16:creationId xmlns:a16="http://schemas.microsoft.com/office/drawing/2014/main" id="{401CB5E2-1922-3AFB-96DA-DCC66447ADA9}"/>
-              </a:ext>
-            </a:extLst>
-          </p:cNvPr>
-          <p:cNvSpPr>
-            <a:spLocks noGrp="1"/>
-          </p:cNvSpPr>
-          <p:nvPr>
-            <p:ph idx="1"/>
-          </p:nvPr>
-        </p:nvSpPr>
-        <p:spPr/>
-        <p:txBody>
-          <a:bodyPr/>
-          <a:lstStyle/>
-          <a:p>
-            <a:r>
-              <a:rPr lang="en-US" dirty="0"/>
-              <a:t>HADES is a suite of R packages for analyzing observational healthcare data</a:t>
-            </a:r>
-          </a:p>
-          <a:p>
-            <a:r>
-              <a:rPr lang="en-US" dirty="0"/>
-              <a:t>Thanks to the OMOP Common Data Model, HADES runs on a wide variety of data sources across the world</a:t>
-            </a:r>
-          </a:p>
-          <a:p>
-            <a:r>
-              <a:rPr lang="en-US" dirty="0"/>
-              <a:t>Open source, to promote open science (all analytics code can be shared as part of publication)</a:t>
-            </a:r>
-          </a:p>
-          <a:p>
-            <a:r>
-              <a:rPr lang="en-US" dirty="0"/>
-              <a:t>Supports federated networks, where data stay locally, and results are shared</a:t>
-            </a:r>
-          </a:p>
-        </p:txBody>
-      </p:sp>
-      <p:sp>
-        <p:nvSpPr>
-          <p:cNvPr id="4" name="Slide Number Placeholder 3">
-            <a:extLst>
-              <a:ext uri="{FF2B5EF4-FFF2-40B4-BE49-F238E27FC236}">
-                <a16:creationId xmlns:a16="http://schemas.microsoft.com/office/drawing/2014/main" id="{A5607259-0C3E-8B34-1A6E-7201CF44D64E}"/>
-              </a:ext>
-            </a:extLst>
-          </p:cNvPr>
-          <p:cNvSpPr>
-            <a:spLocks noGrp="1"/>
-          </p:cNvSpPr>
-          <p:nvPr>
-            <p:ph type="sldNum" sz="quarter" idx="4"/>
-          </p:nvPr>
-        </p:nvSpPr>
-        <p:spPr/>
-        <p:txBody>
-          <a:bodyPr/>
-          <a:lstStyle/>
-          <a:p>
-            <a:fld id="{444583ED-F364-40B3-B25B-483B5033DFA3}" type="slidenum">
-              <a:rPr lang="en-US" smtClean="0"/>
-              <a:pPr/>
-              <a:t>29</a:t>
-            </a:fld>
-            <a:endParaRPr lang="en-US"/>
-          </a:p>
-        </p:txBody>
-      </p:sp>
-    </p:spTree>
-    <p:extLst>
-      <p:ext uri="{BB962C8B-B14F-4D97-AF65-F5344CB8AC3E}">
-        <p14:creationId xmlns:p14="http://schemas.microsoft.com/office/powerpoint/2010/main" val="1483578576"/>
-      </p:ext>
-    </p:extLst>
-  </p:cSld>
-  <p:clrMapOvr>
-    <a:masterClrMapping/>
-  </p:clrMapOvr>
-  <p:timing>
-    <p:tnLst>
-      <p:par>
-        <p:cTn id="1" dur="indefinite" restart="never" nodeType="tmRoot">
-          <p:childTnLst>
-            <p:seq concurrent="1" nextAc="seek">
-              <p:cTn id="2" dur="indefinite" nodeType="mainSeq">
-                <p:childTnLst>
-                  <p:par>
-                    <p:cTn id="3" fill="hold">
-                      <p:stCondLst>
-                        <p:cond delay="indefinite"/>
-                      </p:stCondLst>
-                      <p:childTnLst>
-                        <p:par>
-                          <p:cTn id="4" fill="hold">
-                            <p:stCondLst>
-                              <p:cond delay="0"/>
-                            </p:stCondLst>
-                            <p:childTnLst>
-                              <p:par>
-                                <p:cTn id="5" presetID="1" presetClass="entr" presetSubtype="0" fill="hold" grpId="0" nodeType="clickEffect">
-                                  <p:stCondLst>
-                                    <p:cond delay="0"/>
-                                  </p:stCondLst>
-                                  <p:childTnLst>
-                                    <p:set>
-                                      <p:cBhvr>
-                                        <p:cTn id="6" dur="1" fill="hold">
-                                          <p:stCondLst>
-                                            <p:cond delay="0"/>
-                                          </p:stCondLst>
-                                        </p:cTn>
-                                        <p:tgtEl>
-                                          <p:spTgt spid="3">
-                                            <p:txEl>
-                                              <p:pRg st="0" end="0"/>
-                                            </p:txEl>
-                                          </p:spTgt>
-                                        </p:tgtEl>
-                                        <p:attrNameLst>
-                                          <p:attrName>style.visibility</p:attrName>
-                                        </p:attrNameLst>
-                                      </p:cBhvr>
-                                      <p:to>
-                                        <p:strVal val="visible"/>
-                                      </p:to>
-                                    </p:set>
-                                  </p:childTnLst>
-                                </p:cTn>
-                              </p:par>
-                            </p:childTnLst>
-                          </p:cTn>
-                        </p:par>
-                      </p:childTnLst>
-                    </p:cTn>
-                  </p:par>
-                  <p:par>
-                    <p:cTn id="7" fill="hold">
-                      <p:stCondLst>
-                        <p:cond delay="indefinite"/>
-                      </p:stCondLst>
-                      <p:childTnLst>
-                        <p:par>
-                          <p:cTn id="8" fill="hold">
-                            <p:stCondLst>
-                              <p:cond delay="0"/>
-                            </p:stCondLst>
-                            <p:childTnLst>
-                              <p:par>
-                                <p:cTn id="9" presetID="1" presetClass="entr" presetSubtype="0" fill="hold" grpId="0" nodeType="clickEffect">
-                                  <p:stCondLst>
-                                    <p:cond delay="0"/>
-                                  </p:stCondLst>
-                                  <p:childTnLst>
-                                    <p:set>
-                                      <p:cBhvr>
-                                        <p:cTn id="10" dur="1" fill="hold">
-                                          <p:stCondLst>
-                                            <p:cond delay="0"/>
-                                          </p:stCondLst>
-                                        </p:cTn>
-                                        <p:tgtEl>
-                                          <p:spTgt spid="3">
-                                            <p:txEl>
-                                              <p:pRg st="1" end="1"/>
-                                            </p:txEl>
-                                          </p:spTgt>
-                                        </p:tgtEl>
-                                        <p:attrNameLst>
-                                          <p:attrName>style.visibility</p:attrName>
-                                        </p:attrNameLst>
-                                      </p:cBhvr>
-                                      <p:to>
-                                        <p:strVal val="visible"/>
-                                      </p:to>
-                                    </p:set>
-                                  </p:childTnLst>
-                                </p:cTn>
-                              </p:par>
-                            </p:childTnLst>
-                          </p:cTn>
-                        </p:par>
-                      </p:childTnLst>
-                    </p:cTn>
-                  </p:par>
-                  <p:par>
-                    <p:cTn id="11" fill="hold">
-                      <p:stCondLst>
-                        <p:cond delay="indefinite"/>
-                      </p:stCondLst>
-                      <p:childTnLst>
-                        <p:par>
-                          <p:cTn id="12" fill="hold">
-                            <p:stCondLst>
-                              <p:cond delay="0"/>
-                            </p:stCondLst>
-                            <p:childTnLst>
-                              <p:par>
-                                <p:cTn id="13" presetID="1" presetClass="entr" presetSubtype="0" fill="hold" grpId="0" nodeType="clickEffect">
-                                  <p:stCondLst>
-                                    <p:cond delay="0"/>
-                                  </p:stCondLst>
-                                  <p:childTnLst>
-                                    <p:set>
-                                      <p:cBhvr>
-                                        <p:cTn id="14" dur="1" fill="hold">
-                                          <p:stCondLst>
-                                            <p:cond delay="0"/>
-                                          </p:stCondLst>
-                                        </p:cTn>
-                                        <p:tgtEl>
-                                          <p:spTgt spid="3">
-                                            <p:txEl>
-                                              <p:pRg st="2" end="2"/>
-                                            </p:txEl>
-                                          </p:spTgt>
-                                        </p:tgtEl>
-                                        <p:attrNameLst>
-                                          <p:attrName>style.visibility</p:attrName>
-                                        </p:attrNameLst>
-                                      </p:cBhvr>
-                                      <p:to>
-                                        <p:strVal val="visible"/>
-                                      </p:to>
-                                    </p:set>
-                                  </p:childTnLst>
-                                </p:cTn>
-                              </p:par>
-                            </p:childTnLst>
-                          </p:cTn>
-                        </p:par>
-                      </p:childTnLst>
-                    </p:cTn>
-                  </p:par>
-                  <p:par>
-                    <p:cTn id="15" fill="hold">
-                      <p:stCondLst>
-                        <p:cond delay="indefinite"/>
-                      </p:stCondLst>
-                      <p:childTnLst>
-                        <p:par>
-                          <p:cTn id="16" fill="hold">
-                            <p:stCondLst>
-                              <p:cond delay="0"/>
-                            </p:stCondLst>
-                            <p:childTnLst>
-                              <p:par>
-                                <p:cTn id="17" presetID="1" presetClass="entr" presetSubtype="0" fill="hold" grpId="0" nodeType="clickEffect">
-                                  <p:stCondLst>
-                                    <p:cond delay="0"/>
-                                  </p:stCondLst>
-                                  <p:childTnLst>
-                                    <p:set>
-                                      <p:cBhvr>
-                                        <p:cTn id="18" dur="1" fill="hold">
-                                          <p:stCondLst>
-                                            <p:cond delay="0"/>
-                                          </p:stCondLst>
-                                        </p:cTn>
-                                        <p:tgtEl>
-                                          <p:spTgt spid="3">
-                                            <p:txEl>
-                                              <p:pRg st="3" end="3"/>
-                                            </p:txEl>
-                                          </p:spTgt>
-                                        </p:tgtEl>
-                                        <p:attrNameLst>
-                                          <p:attrName>style.visibility</p:attrName>
-                                        </p:attrNameLst>
-                                      </p:cBhvr>
-                                      <p:to>
-                                        <p:strVal val="visible"/>
-                                      </p:to>
-                                    </p:set>
-                                  </p:childTnLst>
-                                </p:cTn>
-                              </p:par>
-                            </p:childTnLst>
-                          </p:cTn>
-                        </p:par>
-                      </p:childTnLst>
-                    </p:cTn>
-                  </p:par>
-                </p:childTnLst>
-              </p:cTn>
-              <p:prevCondLst>
-                <p:cond evt="onPrev" delay="0">
-                  <p:tgtEl>
-                    <p:sldTgt/>
-                  </p:tgtEl>
-                </p:cond>
-              </p:prevCondLst>
-              <p:nextCondLst>
-                <p:cond evt="onNext" delay="0">
-                  <p:tgtEl>
-                    <p:sldTgt/>
-                  </p:tgtEl>
-                </p:cond>
-              </p:nextCondLst>
-            </p:seq>
-          </p:childTnLst>
-        </p:cTn>
-      </p:par>
-    </p:tnLst>
-    <p:bldLst>
-      <p:bldP spid="3" grpId="0" build="p"/>
-    </p:bldLst>
-  </p:timing>
 </p:sld>
 </file>
 
@@ -26257,6 +26490,369 @@
                                           <p:spTgt spid="3">
                                             <p:txEl>
                                               <p:pRg st="8" end="8"/>
+                                            </p:txEl>
+                                          </p:spTgt>
+                                        </p:tgtEl>
+                                        <p:attrNameLst>
+                                          <p:attrName>style.visibility</p:attrName>
+                                        </p:attrNameLst>
+                                      </p:cBhvr>
+                                      <p:to>
+                                        <p:strVal val="visible"/>
+                                      </p:to>
+                                    </p:set>
+                                  </p:childTnLst>
+                                </p:cTn>
+                              </p:par>
+                            </p:childTnLst>
+                          </p:cTn>
+                        </p:par>
+                      </p:childTnLst>
+                    </p:cTn>
+                  </p:par>
+                </p:childTnLst>
+              </p:cTn>
+              <p:prevCondLst>
+                <p:cond evt="onPrev" delay="0">
+                  <p:tgtEl>
+                    <p:sldTgt/>
+                  </p:tgtEl>
+                </p:cond>
+              </p:prevCondLst>
+              <p:nextCondLst>
+                <p:cond evt="onNext" delay="0">
+                  <p:tgtEl>
+                    <p:sldTgt/>
+                  </p:tgtEl>
+                </p:cond>
+              </p:nextCondLst>
+            </p:seq>
+          </p:childTnLst>
+        </p:cTn>
+      </p:par>
+    </p:tnLst>
+    <p:bldLst>
+      <p:bldP spid="3" grpId="0" build="p"/>
+    </p:bldLst>
+  </p:timing>
+</p:sld>
+</file>
+
+<file path=ppt/slides/slide30.xml><?xml version="1.0" encoding="utf-8"?>
+<p:sld xmlns:a="http://schemas.openxmlformats.org/drawingml/2006/main" xmlns:r="http://schemas.openxmlformats.org/officeDocument/2006/relationships" xmlns:p="http://schemas.openxmlformats.org/presentationml/2006/main">
+  <p:cSld>
+    <p:spTree>
+      <p:nvGrpSpPr>
+        <p:cNvPr id="1" name=""/>
+        <p:cNvGrpSpPr/>
+        <p:nvPr/>
+      </p:nvGrpSpPr>
+      <p:grpSpPr>
+        <a:xfrm>
+          <a:off x="0" y="0"/>
+          <a:ext cx="0" cy="0"/>
+          <a:chOff x="0" y="0"/>
+          <a:chExt cx="0" cy="0"/>
+        </a:xfrm>
+      </p:grpSpPr>
+      <p:sp>
+        <p:nvSpPr>
+          <p:cNvPr id="2" name="Title 1">
+            <a:extLst>
+              <a:ext uri="{FF2B5EF4-FFF2-40B4-BE49-F238E27FC236}">
+                <a16:creationId xmlns:a16="http://schemas.microsoft.com/office/drawing/2014/main" id="{1DF5F88C-624F-08DC-8C51-866A8FC78C74}"/>
+              </a:ext>
+            </a:extLst>
+          </p:cNvPr>
+          <p:cNvSpPr>
+            <a:spLocks noGrp="1"/>
+          </p:cNvSpPr>
+          <p:nvPr>
+            <p:ph type="title"/>
+          </p:nvPr>
+        </p:nvSpPr>
+        <p:spPr/>
+        <p:txBody>
+          <a:bodyPr/>
+          <a:lstStyle/>
+          <a:p>
+            <a:r>
+              <a:rPr lang="en-US" dirty="0"/>
+              <a:t>Conclusions</a:t>
+            </a:r>
+          </a:p>
+        </p:txBody>
+      </p:sp>
+      <p:sp>
+        <p:nvSpPr>
+          <p:cNvPr id="3" name="Content Placeholder 2">
+            <a:extLst>
+              <a:ext uri="{FF2B5EF4-FFF2-40B4-BE49-F238E27FC236}">
+                <a16:creationId xmlns:a16="http://schemas.microsoft.com/office/drawing/2014/main" id="{401CB5E2-1922-3AFB-96DA-DCC66447ADA9}"/>
+              </a:ext>
+            </a:extLst>
+          </p:cNvPr>
+          <p:cNvSpPr>
+            <a:spLocks noGrp="1"/>
+          </p:cNvSpPr>
+          <p:nvPr>
+            <p:ph idx="1"/>
+          </p:nvPr>
+        </p:nvSpPr>
+        <p:spPr/>
+        <p:txBody>
+          <a:bodyPr/>
+          <a:lstStyle/>
+          <a:p>
+            <a:r>
+              <a:rPr lang="en-US" dirty="0"/>
+              <a:t>HADES is a suite of R packages for analyzing observational healthcare data</a:t>
+            </a:r>
+          </a:p>
+          <a:p>
+            <a:r>
+              <a:rPr lang="en-US" dirty="0"/>
+              <a:t>Thanks to the OMOP Common Data Model, HADES runs on a wide variety of data sources across the world</a:t>
+            </a:r>
+          </a:p>
+          <a:p>
+            <a:r>
+              <a:rPr lang="en-US" dirty="0"/>
+              <a:t>Open source, to promote open science (all analytics code can be shared as part of publication)</a:t>
+            </a:r>
+          </a:p>
+          <a:p>
+            <a:r>
+              <a:rPr lang="en-US" dirty="0"/>
+              <a:t>Supports federated networks, where data stay locally, and results are shared</a:t>
+            </a:r>
+          </a:p>
+        </p:txBody>
+      </p:sp>
+      <p:sp>
+        <p:nvSpPr>
+          <p:cNvPr id="4" name="Slide Number Placeholder 3">
+            <a:extLst>
+              <a:ext uri="{FF2B5EF4-FFF2-40B4-BE49-F238E27FC236}">
+                <a16:creationId xmlns:a16="http://schemas.microsoft.com/office/drawing/2014/main" id="{A5607259-0C3E-8B34-1A6E-7201CF44D64E}"/>
+              </a:ext>
+            </a:extLst>
+          </p:cNvPr>
+          <p:cNvSpPr>
+            <a:spLocks noGrp="1"/>
+          </p:cNvSpPr>
+          <p:nvPr>
+            <p:ph type="sldNum" sz="quarter" idx="4"/>
+          </p:nvPr>
+        </p:nvSpPr>
+        <p:spPr/>
+        <p:txBody>
+          <a:bodyPr/>
+          <a:lstStyle/>
+          <a:p>
+            <a:fld id="{444583ED-F364-40B3-B25B-483B5033DFA3}" type="slidenum">
+              <a:rPr lang="en-US" smtClean="0"/>
+              <a:pPr/>
+              <a:t>30</a:t>
+            </a:fld>
+            <a:endParaRPr lang="en-US"/>
+          </a:p>
+        </p:txBody>
+      </p:sp>
+    </p:spTree>
+    <p:extLst>
+      <p:ext uri="{BB962C8B-B14F-4D97-AF65-F5344CB8AC3E}">
+        <p14:creationId xmlns:p14="http://schemas.microsoft.com/office/powerpoint/2010/main" val="1483578576"/>
+      </p:ext>
+    </p:extLst>
+  </p:cSld>
+  <p:clrMapOvr>
+    <a:masterClrMapping/>
+  </p:clrMapOvr>
+  <p:timing>
+    <p:tnLst>
+      <p:par>
+        <p:cTn id="1" dur="indefinite" restart="never" nodeType="tmRoot">
+          <p:childTnLst>
+            <p:seq concurrent="1" nextAc="seek">
+              <p:cTn id="2" dur="indefinite" nodeType="mainSeq">
+                <p:childTnLst>
+                  <p:par>
+                    <p:cTn id="3" fill="hold">
+                      <p:stCondLst>
+                        <p:cond delay="indefinite"/>
+                      </p:stCondLst>
+                      <p:childTnLst>
+                        <p:par>
+                          <p:cTn id="4" fill="hold">
+                            <p:stCondLst>
+                              <p:cond delay="0"/>
+                            </p:stCondLst>
+                            <p:childTnLst>
+                              <p:par>
+                                <p:cTn id="5" presetID="1" presetClass="entr" presetSubtype="0" fill="hold" grpId="0" nodeType="clickEffect">
+                                  <p:stCondLst>
+                                    <p:cond delay="0"/>
+                                  </p:stCondLst>
+                                  <p:childTnLst>
+                                    <p:set>
+                                      <p:cBhvr>
+                                        <p:cTn id="6" dur="1" fill="hold">
+                                          <p:stCondLst>
+                                            <p:cond delay="0"/>
+                                          </p:stCondLst>
+                                        </p:cTn>
+                                        <p:tgtEl>
+                                          <p:spTgt spid="3">
+                                            <p:txEl>
+                                              <p:pRg st="0" end="0"/>
+                                            </p:txEl>
+                                          </p:spTgt>
+                                        </p:tgtEl>
+                                        <p:attrNameLst>
+                                          <p:attrName>style.visibility</p:attrName>
+                                        </p:attrNameLst>
+                                      </p:cBhvr>
+                                      <p:to>
+                                        <p:strVal val="visible"/>
+                                      </p:to>
+                                    </p:set>
+                                  </p:childTnLst>
+                                </p:cTn>
+                              </p:par>
+                            </p:childTnLst>
+                          </p:cTn>
+                        </p:par>
+                      </p:childTnLst>
+                    </p:cTn>
+                  </p:par>
+                  <p:par>
+                    <p:cTn id="7" fill="hold">
+                      <p:stCondLst>
+                        <p:cond delay="indefinite"/>
+                      </p:stCondLst>
+                      <p:childTnLst>
+                        <p:par>
+                          <p:cTn id="8" fill="hold">
+                            <p:stCondLst>
+                              <p:cond delay="0"/>
+                            </p:stCondLst>
+                            <p:childTnLst>
+                              <p:par>
+                                <p:cTn id="9" presetID="1" presetClass="entr" presetSubtype="0" fill="hold" grpId="0" nodeType="clickEffect">
+                                  <p:stCondLst>
+                                    <p:cond delay="0"/>
+                                  </p:stCondLst>
+                                  <p:childTnLst>
+                                    <p:set>
+                                      <p:cBhvr>
+                                        <p:cTn id="10" dur="1" fill="hold">
+                                          <p:stCondLst>
+                                            <p:cond delay="0"/>
+                                          </p:stCondLst>
+                                        </p:cTn>
+                                        <p:tgtEl>
+                                          <p:spTgt spid="3">
+                                            <p:txEl>
+                                              <p:pRg st="1" end="1"/>
+                                            </p:txEl>
+                                          </p:spTgt>
+                                        </p:tgtEl>
+                                        <p:attrNameLst>
+                                          <p:attrName>style.visibility</p:attrName>
+                                        </p:attrNameLst>
+                                      </p:cBhvr>
+                                      <p:to>
+                                        <p:strVal val="visible"/>
+                                      </p:to>
+                                    </p:set>
+                                  </p:childTnLst>
+                                </p:cTn>
+                              </p:par>
+                            </p:childTnLst>
+                          </p:cTn>
+                        </p:par>
+                      </p:childTnLst>
+                    </p:cTn>
+                  </p:par>
+                  <p:par>
+                    <p:cTn id="11" fill="hold">
+                      <p:stCondLst>
+                        <p:cond delay="indefinite"/>
+                      </p:stCondLst>
+                      <p:childTnLst>
+                        <p:par>
+                          <p:cTn id="12" fill="hold">
+                            <p:stCondLst>
+                              <p:cond delay="0"/>
+                            </p:stCondLst>
+                            <p:childTnLst>
+                              <p:par>
+                                <p:cTn id="13" presetID="1" presetClass="entr" presetSubtype="0" fill="hold" grpId="0" nodeType="clickEffect">
+                                  <p:stCondLst>
+                                    <p:cond delay="0"/>
+                                  </p:stCondLst>
+                                  <p:childTnLst>
+                                    <p:set>
+                                      <p:cBhvr>
+                                        <p:cTn id="14" dur="1" fill="hold">
+                                          <p:stCondLst>
+                                            <p:cond delay="0"/>
+                                          </p:stCondLst>
+                                        </p:cTn>
+                                        <p:tgtEl>
+                                          <p:spTgt spid="3">
+                                            <p:txEl>
+                                              <p:pRg st="2" end="2"/>
+                                            </p:txEl>
+                                          </p:spTgt>
+                                        </p:tgtEl>
+                                        <p:attrNameLst>
+                                          <p:attrName>style.visibility</p:attrName>
+                                        </p:attrNameLst>
+                                      </p:cBhvr>
+                                      <p:to>
+                                        <p:strVal val="visible"/>
+                                      </p:to>
+                                    </p:set>
+                                  </p:childTnLst>
+                                </p:cTn>
+                              </p:par>
+                            </p:childTnLst>
+                          </p:cTn>
+                        </p:par>
+                      </p:childTnLst>
+                    </p:cTn>
+                  </p:par>
+                  <p:par>
+                    <p:cTn id="15" fill="hold">
+                      <p:stCondLst>
+                        <p:cond delay="indefinite"/>
+                      </p:stCondLst>
+                      <p:childTnLst>
+                        <p:par>
+                          <p:cTn id="16" fill="hold">
+                            <p:stCondLst>
+                              <p:cond delay="0"/>
+                            </p:stCondLst>
+                            <p:childTnLst>
+                              <p:par>
+                                <p:cTn id="17" presetID="1" presetClass="entr" presetSubtype="0" fill="hold" grpId="0" nodeType="clickEffect">
+                                  <p:stCondLst>
+                                    <p:cond delay="0"/>
+                                  </p:stCondLst>
+                                  <p:childTnLst>
+                                    <p:set>
+                                      <p:cBhvr>
+                                        <p:cTn id="18" dur="1" fill="hold">
+                                          <p:stCondLst>
+                                            <p:cond delay="0"/>
+                                          </p:stCondLst>
+                                        </p:cTn>
+                                        <p:tgtEl>
+                                          <p:spTgt spid="3">
+                                            <p:txEl>
+                                              <p:pRg st="3" end="3"/>
                                             </p:txEl>
                                           </p:spTgt>
                                         </p:tgtEl>
@@ -26970,7 +27566,7 @@
           <p:cNvPr id="2" name="Title 1">
             <a:extLst>
               <a:ext uri="{FF2B5EF4-FFF2-40B4-BE49-F238E27FC236}">
-                <a16:creationId xmlns:a16="http://schemas.microsoft.com/office/drawing/2014/main" id="{8B080DF5-A565-D544-8B51-E2A7D54C770D}"/>
+                <a16:creationId xmlns:a16="http://schemas.microsoft.com/office/drawing/2014/main" id="{86B38CFD-E095-B9B5-AC58-90F19411AFD3}"/>
               </a:ext>
             </a:extLst>
           </p:cNvPr>
@@ -26988,7 +27584,7 @@
           <a:p>
             <a:r>
               <a:rPr lang="en-US" dirty="0"/>
-              <a:t>HADES – supporting packages</a:t>
+              <a:t>HADES paper</a:t>
             </a:r>
           </a:p>
         </p:txBody>
@@ -26998,7 +27594,7 @@
           <p:cNvPr id="3" name="Content Placeholder 2">
             <a:extLst>
               <a:ext uri="{FF2B5EF4-FFF2-40B4-BE49-F238E27FC236}">
-                <a16:creationId xmlns:a16="http://schemas.microsoft.com/office/drawing/2014/main" id="{B0DB2ED5-C228-F8E2-1C95-6E44EB9FF06E}"/>
+                <a16:creationId xmlns:a16="http://schemas.microsoft.com/office/drawing/2014/main" id="{F479DAF0-AED5-BFBE-3989-079AA3A07275}"/>
               </a:ext>
             </a:extLst>
           </p:cNvPr>
@@ -27009,85 +27605,42 @@
             <p:ph idx="1"/>
           </p:nvPr>
         </p:nvSpPr>
-        <p:spPr/>
+        <p:spPr>
+          <a:xfrm>
+            <a:off x="609600" y="1219201"/>
+            <a:ext cx="10972800" cy="1752599"/>
+          </a:xfrm>
+        </p:spPr>
         <p:txBody>
-          <a:bodyPr/>
+          <a:bodyPr>
+            <a:normAutofit/>
+          </a:bodyPr>
           <a:lstStyle/>
           <a:p>
             <a:r>
-              <a:rPr lang="en-US" b="1" dirty="0" err="1"/>
-              <a:t>DatabaseConnector</a:t>
-            </a:r>
-            <a:r>
-              <a:rPr lang="en-US" b="1" dirty="0"/>
-              <a:t> + </a:t>
-            </a:r>
-            <a:r>
-              <a:rPr lang="en-US" b="1" dirty="0" err="1"/>
-              <a:t>SqlRender</a:t>
-            </a:r>
-            <a:r>
               <a:rPr lang="en-US" dirty="0"/>
-              <a:t>: write code once, run on all supported platforms (SQL Server, Oracle, Postgres, RedShift, </a:t>
-            </a:r>
-            <a:r>
-              <a:rPr lang="en-US" dirty="0" err="1"/>
-              <a:t>BigQuery</a:t>
-            </a:r>
+              <a:t>Our HADES paper goes deeper into HADES’ design philosophy</a:t>
+            </a:r>
+          </a:p>
+          <a:p>
             <a:r>
               <a:rPr lang="en-US" dirty="0"/>
-              <a:t>, </a:t>
-            </a:r>
-            <a:r>
-              <a:rPr lang="en-US" dirty="0" err="1"/>
-              <a:t>DataBricks</a:t>
-            </a:r>
-            <a:r>
-              <a:rPr lang="en-US" dirty="0"/>
-              <a:t>, Snowflake)</a:t>
-            </a:r>
-          </a:p>
-          <a:p>
-            <a:r>
-              <a:rPr lang="en-US" b="1" dirty="0"/>
-              <a:t>Andromeda</a:t>
-            </a:r>
-            <a:r>
-              <a:rPr lang="en-US" dirty="0"/>
-              <a:t>: Work with data objects too big to fit in memory</a:t>
-            </a:r>
-          </a:p>
-          <a:p>
-            <a:r>
-              <a:rPr lang="en-US" b="1" dirty="0" err="1"/>
-              <a:t>ParallelLogger</a:t>
-            </a:r>
-            <a:r>
-              <a:rPr lang="en-US" dirty="0"/>
-              <a:t>: extensive logging to facilitate remote debugging</a:t>
-            </a:r>
-          </a:p>
-          <a:p>
-            <a:r>
-              <a:rPr lang="en-US" b="1" dirty="0"/>
-              <a:t>Cyclops</a:t>
-            </a:r>
-            <a:r>
-              <a:rPr lang="en-US" dirty="0"/>
-              <a:t>: fit very large regression models (logistic, Poisson, Cox)</a:t>
-            </a:r>
-          </a:p>
-          <a:p>
-            <a:r>
-              <a:rPr lang="en-US" b="1" dirty="0" err="1"/>
-              <a:t>DataQualityDashboard</a:t>
-            </a:r>
-            <a:r>
-              <a:rPr lang="en-US" dirty="0"/>
-              <a:t>: evaluate data quality</a:t>
-            </a:r>
-          </a:p>
-          <a:p>
+              <a:t>Please cite it when you use HADES</a:t>
+            </a:r>
+          </a:p>
+          <a:p>
+            <a:endParaRPr lang="en-US" dirty="0"/>
+          </a:p>
+          <a:p>
+            <a:endParaRPr lang="en-US" dirty="0"/>
+          </a:p>
+          <a:p>
+            <a:endParaRPr lang="en-US" dirty="0"/>
+          </a:p>
+          <a:p>
+            <a:pPr marL="0" indent="0">
+              <a:buNone/>
+            </a:pPr>
             <a:endParaRPr lang="en-US" dirty="0"/>
           </a:p>
         </p:txBody>
@@ -27097,7 +27650,7 @@
           <p:cNvPr id="4" name="Slide Number Placeholder 3">
             <a:extLst>
               <a:ext uri="{FF2B5EF4-FFF2-40B4-BE49-F238E27FC236}">
-                <a16:creationId xmlns:a16="http://schemas.microsoft.com/office/drawing/2014/main" id="{0590024F-F4FF-E07E-CDE4-1E2C54D3EA28}"/>
+                <a16:creationId xmlns:a16="http://schemas.microsoft.com/office/drawing/2014/main" id="{28C1C523-4AD1-8DC2-FEF8-A1FE3D7EFE91}"/>
               </a:ext>
             </a:extLst>
           </p:cNvPr>
@@ -27122,10 +27675,96 @@
           </a:p>
         </p:txBody>
       </p:sp>
+      <p:pic>
+        <p:nvPicPr>
+          <p:cNvPr id="5" name="Picture 4">
+            <a:extLst>
+              <a:ext uri="{FF2B5EF4-FFF2-40B4-BE49-F238E27FC236}">
+                <a16:creationId xmlns:a16="http://schemas.microsoft.com/office/drawing/2014/main" id="{BF9047C6-B08F-5873-5AC7-1B7503ABD277}"/>
+              </a:ext>
+            </a:extLst>
+          </p:cNvPr>
+          <p:cNvPicPr>
+            <a:picLocks noChangeAspect="1"/>
+          </p:cNvPicPr>
+          <p:nvPr/>
+        </p:nvPicPr>
+        <p:blipFill>
+          <a:blip r:embed="rId2"/>
+          <a:stretch>
+            <a:fillRect/>
+          </a:stretch>
+        </p:blipFill>
+        <p:spPr>
+          <a:xfrm>
+            <a:off x="7162800" y="4395127"/>
+            <a:ext cx="4572000" cy="2462873"/>
+          </a:xfrm>
+          <a:prstGeom prst="rect">
+            <a:avLst/>
+          </a:prstGeom>
+          <a:ln>
+            <a:noFill/>
+          </a:ln>
+          <a:effectLst>
+            <a:outerShdw blurRad="292100" dist="139700" dir="2700000" algn="tl" rotWithShape="0">
+              <a:srgbClr val="333333">
+                <a:alpha val="65000"/>
+              </a:srgbClr>
+            </a:outerShdw>
+          </a:effectLst>
+        </p:spPr>
+      </p:pic>
+      <p:sp>
+        <p:nvSpPr>
+          <p:cNvPr id="7" name="TextBox 6">
+            <a:extLst>
+              <a:ext uri="{FF2B5EF4-FFF2-40B4-BE49-F238E27FC236}">
+                <a16:creationId xmlns:a16="http://schemas.microsoft.com/office/drawing/2014/main" id="{A6D5F73B-22F0-B025-0491-F9AB8F2BC3AA}"/>
+              </a:ext>
+            </a:extLst>
+          </p:cNvPr>
+          <p:cNvSpPr txBox="1"/>
+          <p:nvPr/>
+        </p:nvSpPr>
+        <p:spPr>
+          <a:xfrm>
+            <a:off x="609600" y="5038634"/>
+            <a:ext cx="6139542" cy="1200329"/>
+          </a:xfrm>
+          <a:prstGeom prst="rect">
+            <a:avLst/>
+          </a:prstGeom>
+          <a:noFill/>
+        </p:spPr>
+        <p:txBody>
+          <a:bodyPr wrap="square">
+            <a:spAutoFit/>
+          </a:bodyPr>
+          <a:lstStyle/>
+          <a:p>
+            <a:pPr marL="0" indent="0">
+              <a:buNone/>
+            </a:pPr>
+            <a:r>
+              <a:rPr lang="en-US" dirty="0"/>
+              <a:t>Schuemie M, Reps J, Black A, et al. 2024 Health-Analytics Data to Evidence Suite (HADES): Open-Source Software for Observational Research. Stud Health Technol Inform. 2024 Jan 25:310:966-970. </a:t>
+            </a:r>
+            <a:r>
+              <a:rPr lang="en-US" dirty="0" err="1"/>
+              <a:t>doi</a:t>
+            </a:r>
+            <a:r>
+              <a:rPr lang="en-US" dirty="0"/>
+              <a:t>: 0.3233/SHTI231108.</a:t>
+            </a:r>
+          </a:p>
+        </p:txBody>
+      </p:sp>
     </p:spTree>
     <p:extLst>
       <p:ext uri="{BB962C8B-B14F-4D97-AF65-F5344CB8AC3E}">
-        <p14:creationId xmlns:p14="http://schemas.microsoft.com/office/powerpoint/2010/main" val="2004046977"/>
+        <p14:creationId xmlns:p14="http://schemas.microsoft.com/office/powerpoint/2010/main" val="4186771914"/>
       </p:ext>
     </p:extLst>
   </p:cSld>
@@ -27157,6 +27796,193 @@
           <p:cNvPr id="2" name="Title 1">
             <a:extLst>
               <a:ext uri="{FF2B5EF4-FFF2-40B4-BE49-F238E27FC236}">
+                <a16:creationId xmlns:a16="http://schemas.microsoft.com/office/drawing/2014/main" id="{8B080DF5-A565-D544-8B51-E2A7D54C770D}"/>
+              </a:ext>
+            </a:extLst>
+          </p:cNvPr>
+          <p:cNvSpPr>
+            <a:spLocks noGrp="1"/>
+          </p:cNvSpPr>
+          <p:nvPr>
+            <p:ph type="title"/>
+          </p:nvPr>
+        </p:nvSpPr>
+        <p:spPr/>
+        <p:txBody>
+          <a:bodyPr/>
+          <a:lstStyle/>
+          <a:p>
+            <a:r>
+              <a:rPr lang="en-US" dirty="0"/>
+              <a:t>HADES – supporting packages</a:t>
+            </a:r>
+          </a:p>
+        </p:txBody>
+      </p:sp>
+      <p:sp>
+        <p:nvSpPr>
+          <p:cNvPr id="3" name="Content Placeholder 2">
+            <a:extLst>
+              <a:ext uri="{FF2B5EF4-FFF2-40B4-BE49-F238E27FC236}">
+                <a16:creationId xmlns:a16="http://schemas.microsoft.com/office/drawing/2014/main" id="{B0DB2ED5-C228-F8E2-1C95-6E44EB9FF06E}"/>
+              </a:ext>
+            </a:extLst>
+          </p:cNvPr>
+          <p:cNvSpPr>
+            <a:spLocks noGrp="1"/>
+          </p:cNvSpPr>
+          <p:nvPr>
+            <p:ph idx="1"/>
+          </p:nvPr>
+        </p:nvSpPr>
+        <p:spPr/>
+        <p:txBody>
+          <a:bodyPr/>
+          <a:lstStyle/>
+          <a:p>
+            <a:r>
+              <a:rPr lang="en-US" b="1" dirty="0" err="1"/>
+              <a:t>DatabaseConnector</a:t>
+            </a:r>
+            <a:r>
+              <a:rPr lang="en-US" b="1" dirty="0"/>
+              <a:t> + </a:t>
+            </a:r>
+            <a:r>
+              <a:rPr lang="en-US" b="1" dirty="0" err="1"/>
+              <a:t>SqlRender</a:t>
+            </a:r>
+            <a:r>
+              <a:rPr lang="en-US" dirty="0"/>
+              <a:t>: write code once, run on all supported platforms (SQL Server, Oracle, Postgres, RedShift, </a:t>
+            </a:r>
+            <a:r>
+              <a:rPr lang="en-US" dirty="0" err="1"/>
+              <a:t>BigQuery</a:t>
+            </a:r>
+            <a:r>
+              <a:rPr lang="en-US" dirty="0"/>
+              <a:t>, </a:t>
+            </a:r>
+            <a:r>
+              <a:rPr lang="en-US" dirty="0" err="1"/>
+              <a:t>DataBricks</a:t>
+            </a:r>
+            <a:r>
+              <a:rPr lang="en-US" dirty="0"/>
+              <a:t>, Snowflake)</a:t>
+            </a:r>
+          </a:p>
+          <a:p>
+            <a:r>
+              <a:rPr lang="en-US" b="1" dirty="0"/>
+              <a:t>Andromeda</a:t>
+            </a:r>
+            <a:r>
+              <a:rPr lang="en-US" dirty="0"/>
+              <a:t>: Work with data objects too big to fit in memory</a:t>
+            </a:r>
+          </a:p>
+          <a:p>
+            <a:r>
+              <a:rPr lang="en-US" b="1" dirty="0" err="1"/>
+              <a:t>ParallelLogger</a:t>
+            </a:r>
+            <a:r>
+              <a:rPr lang="en-US" dirty="0"/>
+              <a:t>: extensive logging to facilitate remote debugging</a:t>
+            </a:r>
+          </a:p>
+          <a:p>
+            <a:r>
+              <a:rPr lang="en-US" b="1" dirty="0"/>
+              <a:t>Cyclops</a:t>
+            </a:r>
+            <a:r>
+              <a:rPr lang="en-US" dirty="0"/>
+              <a:t>: fit very large regression models (logistic, Poisson, Cox)</a:t>
+            </a:r>
+          </a:p>
+          <a:p>
+            <a:r>
+              <a:rPr lang="en-US" b="1" dirty="0" err="1"/>
+              <a:t>DataQualityDashboard</a:t>
+            </a:r>
+            <a:r>
+              <a:rPr lang="en-US" dirty="0"/>
+              <a:t>: evaluate data quality</a:t>
+            </a:r>
+          </a:p>
+          <a:p>
+            <a:endParaRPr lang="en-US" dirty="0"/>
+          </a:p>
+        </p:txBody>
+      </p:sp>
+      <p:sp>
+        <p:nvSpPr>
+          <p:cNvPr id="4" name="Slide Number Placeholder 3">
+            <a:extLst>
+              <a:ext uri="{FF2B5EF4-FFF2-40B4-BE49-F238E27FC236}">
+                <a16:creationId xmlns:a16="http://schemas.microsoft.com/office/drawing/2014/main" id="{0590024F-F4FF-E07E-CDE4-1E2C54D3EA28}"/>
+              </a:ext>
+            </a:extLst>
+          </p:cNvPr>
+          <p:cNvSpPr>
+            <a:spLocks noGrp="1"/>
+          </p:cNvSpPr>
+          <p:nvPr>
+            <p:ph type="sldNum" sz="quarter" idx="4"/>
+          </p:nvPr>
+        </p:nvSpPr>
+        <p:spPr/>
+        <p:txBody>
+          <a:bodyPr/>
+          <a:lstStyle/>
+          <a:p>
+            <a:fld id="{444583ED-F364-40B3-B25B-483B5033DFA3}" type="slidenum">
+              <a:rPr lang="en-US" smtClean="0"/>
+              <a:pPr/>
+              <a:t>6</a:t>
+            </a:fld>
+            <a:endParaRPr lang="en-US"/>
+          </a:p>
+        </p:txBody>
+      </p:sp>
+    </p:spTree>
+    <p:extLst>
+      <p:ext uri="{BB962C8B-B14F-4D97-AF65-F5344CB8AC3E}">
+        <p14:creationId xmlns:p14="http://schemas.microsoft.com/office/powerpoint/2010/main" val="2004046977"/>
+      </p:ext>
+    </p:extLst>
+  </p:cSld>
+  <p:clrMapOvr>
+    <a:masterClrMapping/>
+  </p:clrMapOvr>
+</p:sld>
+</file>
+
+<file path=ppt/slides/slide7.xml><?xml version="1.0" encoding="utf-8"?>
+<p:sld xmlns:a="http://schemas.openxmlformats.org/drawingml/2006/main" xmlns:r="http://schemas.openxmlformats.org/officeDocument/2006/relationships" xmlns:p="http://schemas.openxmlformats.org/presentationml/2006/main">
+  <p:cSld>
+    <p:spTree>
+      <p:nvGrpSpPr>
+        <p:cNvPr id="1" name=""/>
+        <p:cNvGrpSpPr/>
+        <p:nvPr/>
+      </p:nvGrpSpPr>
+      <p:grpSpPr>
+        <a:xfrm>
+          <a:off x="0" y="0"/>
+          <a:ext cx="0" cy="0"/>
+          <a:chOff x="0" y="0"/>
+          <a:chExt cx="0" cy="0"/>
+        </a:xfrm>
+      </p:grpSpPr>
+      <p:sp>
+        <p:nvSpPr>
+          <p:cNvPr id="2" name="Title 1">
+            <a:extLst>
+              <a:ext uri="{FF2B5EF4-FFF2-40B4-BE49-F238E27FC236}">
                 <a16:creationId xmlns:a16="http://schemas.microsoft.com/office/drawing/2014/main" id="{D4673C94-782E-F84B-6768-FE15BA02689B}"/>
               </a:ext>
             </a:extLst>
@@ -27325,7 +28151,7 @@
             <a:fld id="{444583ED-F364-40B3-B25B-483B5033DFA3}" type="slidenum">
               <a:rPr lang="en-US" smtClean="0"/>
               <a:pPr/>
-              <a:t>6</a:t>
+              <a:t>7</a:t>
             </a:fld>
             <a:endParaRPr lang="en-US"/>
           </a:p>
@@ -27695,7 +28521,7 @@
 </p:sld>
 </file>
 
-<file path=ppt/slides/slide7.xml><?xml version="1.0" encoding="utf-8"?>
+<file path=ppt/slides/slide8.xml><?xml version="1.0" encoding="utf-8"?>
 <p:sld xmlns:a="http://schemas.openxmlformats.org/drawingml/2006/main" xmlns:r="http://schemas.openxmlformats.org/officeDocument/2006/relationships" xmlns:p="http://schemas.openxmlformats.org/presentationml/2006/main">
   <p:cSld>
     <p:spTree>
@@ -27769,6 +28595,16 @@
               <a:rPr lang="en-US" dirty="0"/>
               <a:t>: characterizations of a target and a comparator cohort</a:t>
             </a:r>
+          </a:p>
+          <a:p>
+            <a:r>
+              <a:rPr lang="en-US" b="1" dirty="0" err="1"/>
+              <a:t>CohortIncidence</a:t>
+            </a:r>
+            <a:r>
+              <a:rPr lang="en-US" dirty="0"/>
+              <a:t>: calculate incidence rates and proportions</a:t>
+            </a:r>
             <a:endParaRPr lang="en-US" b="1" dirty="0"/>
           </a:p>
           <a:p>
@@ -27806,7 +28642,7 @@
             </a:r>
             <a:r>
               <a:rPr lang="en-US" dirty="0"/>
-              <a:t>: Calibrate causal effect estimates based on negative controls</a:t>
+              <a:t>: calibrate causal effect estimates based on negative controls</a:t>
             </a:r>
           </a:p>
           <a:p>
@@ -27816,7 +28652,7 @@
             </a:r>
             <a:r>
               <a:rPr lang="en-US" dirty="0"/>
-              <a:t>: Combine causal effect estimates across databases without sharing patient-level data.</a:t>
+              <a:t>: combine causal effect estimates across databases without sharing patient-level data.</a:t>
             </a:r>
           </a:p>
         </p:txBody>
@@ -27845,7 +28681,7 @@
             <a:fld id="{444583ED-F364-40B3-B25B-483B5033DFA3}" type="slidenum">
               <a:rPr lang="en-US" smtClean="0"/>
               <a:pPr/>
-              <a:t>7</a:t>
+              <a:t>8</a:t>
             </a:fld>
             <a:endParaRPr lang="en-US"/>
           </a:p>
@@ -27864,7 +28700,7 @@
 </p:sld>
 </file>
 
-<file path=ppt/slides/slide8.xml><?xml version="1.0" encoding="utf-8"?>
+<file path=ppt/slides/slide9.xml><?xml version="1.0" encoding="utf-8"?>
 <p:sld xmlns:a="http://schemas.openxmlformats.org/drawingml/2006/main" xmlns:r="http://schemas.openxmlformats.org/officeDocument/2006/relationships" xmlns:p="http://schemas.openxmlformats.org/presentationml/2006/main">
   <p:cSld>
     <p:spTree>
@@ -28061,7 +28897,7 @@
             <a:fld id="{444583ED-F364-40B3-B25B-483B5033DFA3}" type="slidenum">
               <a:rPr lang="en-US" smtClean="0"/>
               <a:pPr/>
-              <a:t>8</a:t>
+              <a:t>9</a:t>
             </a:fld>
             <a:endParaRPr lang="en-US"/>
           </a:p>
@@ -28077,560 +28913,6 @@
   <p:clrMapOvr>
     <a:masterClrMapping/>
   </p:clrMapOvr>
-</p:sld>
-</file>
-
-<file path=ppt/slides/slide9.xml><?xml version="1.0" encoding="utf-8"?>
-<p:sld xmlns:a="http://schemas.openxmlformats.org/drawingml/2006/main" xmlns:r="http://schemas.openxmlformats.org/officeDocument/2006/relationships" xmlns:p="http://schemas.openxmlformats.org/presentationml/2006/main">
-  <p:cSld>
-    <p:spTree>
-      <p:nvGrpSpPr>
-        <p:cNvPr id="1" name=""/>
-        <p:cNvGrpSpPr/>
-        <p:nvPr/>
-      </p:nvGrpSpPr>
-      <p:grpSpPr>
-        <a:xfrm>
-          <a:off x="0" y="0"/>
-          <a:ext cx="0" cy="0"/>
-          <a:chOff x="0" y="0"/>
-          <a:chExt cx="0" cy="0"/>
-        </a:xfrm>
-      </p:grpSpPr>
-      <p:sp>
-        <p:nvSpPr>
-          <p:cNvPr id="2" name="Title 1">
-            <a:extLst>
-              <a:ext uri="{FF2B5EF4-FFF2-40B4-BE49-F238E27FC236}">
-                <a16:creationId xmlns:a16="http://schemas.microsoft.com/office/drawing/2014/main" id="{555FA874-31F8-2A0B-6258-BB278E584894}"/>
-              </a:ext>
-            </a:extLst>
-          </p:cNvPr>
-          <p:cNvSpPr>
-            <a:spLocks noGrp="1"/>
-          </p:cNvSpPr>
-          <p:nvPr>
-            <p:ph type="title"/>
-          </p:nvPr>
-        </p:nvSpPr>
-        <p:spPr/>
-        <p:txBody>
-          <a:bodyPr/>
-          <a:lstStyle/>
-          <a:p>
-            <a:r>
-              <a:rPr lang="en-US" dirty="0"/>
-              <a:t>Publications using HADES</a:t>
-            </a:r>
-          </a:p>
-        </p:txBody>
-      </p:sp>
-      <p:sp>
-        <p:nvSpPr>
-          <p:cNvPr id="3" name="Content Placeholder 2">
-            <a:extLst>
-              <a:ext uri="{FF2B5EF4-FFF2-40B4-BE49-F238E27FC236}">
-                <a16:creationId xmlns:a16="http://schemas.microsoft.com/office/drawing/2014/main" id="{70E5FEF2-F225-1B50-116E-6778C1D60FD2}"/>
-              </a:ext>
-            </a:extLst>
-          </p:cNvPr>
-          <p:cNvSpPr>
-            <a:spLocks noGrp="1"/>
-          </p:cNvSpPr>
-          <p:nvPr>
-            <p:ph idx="1"/>
-          </p:nvPr>
-        </p:nvSpPr>
-        <p:spPr/>
-        <p:txBody>
-          <a:bodyPr/>
-          <a:lstStyle/>
-          <a:p>
-            <a:r>
-              <a:rPr lang="en-US" dirty="0"/>
-              <a:t>38 peer-reviewed clinical research papers</a:t>
-            </a:r>
-          </a:p>
-          <a:p>
-            <a:r>
-              <a:rPr lang="en-US" dirty="0"/>
-              <a:t>29 methods research papers</a:t>
-            </a:r>
-          </a:p>
-        </p:txBody>
-      </p:sp>
-      <p:grpSp>
-        <p:nvGrpSpPr>
-          <p:cNvPr id="4" name="Group 3">
-            <a:extLst>
-              <a:ext uri="{FF2B5EF4-FFF2-40B4-BE49-F238E27FC236}">
-                <a16:creationId xmlns:a16="http://schemas.microsoft.com/office/drawing/2014/main" id="{76541275-E283-3FFF-7A0A-43A8ED6F3B52}"/>
-              </a:ext>
-            </a:extLst>
-          </p:cNvPr>
-          <p:cNvGrpSpPr/>
-          <p:nvPr/>
-        </p:nvGrpSpPr>
-        <p:grpSpPr>
-          <a:xfrm>
-            <a:off x="0" y="2667000"/>
-            <a:ext cx="5562600" cy="4552168"/>
-            <a:chOff x="0" y="1748916"/>
-            <a:chExt cx="6744753" cy="5519586"/>
-          </a:xfrm>
-        </p:grpSpPr>
-        <p:pic>
-          <p:nvPicPr>
-            <p:cNvPr id="5" name="Picture 4">
-              <a:extLst>
-                <a:ext uri="{FF2B5EF4-FFF2-40B4-BE49-F238E27FC236}">
-                  <a16:creationId xmlns:a16="http://schemas.microsoft.com/office/drawing/2014/main" id="{F20FA8D4-8C79-20DF-0728-BEA5D272EF53}"/>
-                </a:ext>
-              </a:extLst>
-            </p:cNvPr>
-            <p:cNvPicPr>
-              <a:picLocks noChangeAspect="1"/>
-            </p:cNvPicPr>
-            <p:nvPr/>
-          </p:nvPicPr>
-          <p:blipFill rotWithShape="1">
-            <a:blip r:embed="rId2" cstate="print">
-              <a:extLst>
-                <a:ext uri="{28A0092B-C50C-407E-A947-70E740481C1C}">
-                  <a14:useLocalDpi xmlns:a14="http://schemas.microsoft.com/office/drawing/2010/main" val="0"/>
-                </a:ext>
-              </a:extLst>
-            </a:blip>
-            <a:srcRect b="-8121"/>
-            <a:stretch/>
-          </p:blipFill>
-          <p:spPr>
-            <a:xfrm>
-              <a:off x="0" y="1748916"/>
-              <a:ext cx="6744753" cy="5519586"/>
-            </a:xfrm>
-            <a:prstGeom prst="rect">
-              <a:avLst/>
-            </a:prstGeom>
-            <a:ln>
-              <a:noFill/>
-            </a:ln>
-            <a:effectLst>
-              <a:outerShdw blurRad="292100" dist="139700" dir="2700000" algn="tl" rotWithShape="0">
-                <a:srgbClr val="333333">
-                  <a:alpha val="65000"/>
-                </a:srgbClr>
-              </a:outerShdw>
-            </a:effectLst>
-          </p:spPr>
-        </p:pic>
-        <p:pic>
-          <p:nvPicPr>
-            <p:cNvPr id="6" name="Picture 5">
-              <a:extLst>
-                <a:ext uri="{FF2B5EF4-FFF2-40B4-BE49-F238E27FC236}">
-                  <a16:creationId xmlns:a16="http://schemas.microsoft.com/office/drawing/2014/main" id="{4073CDCA-BF7A-4924-D26E-050E04EFF78B}"/>
-                </a:ext>
-              </a:extLst>
-            </p:cNvPr>
-            <p:cNvPicPr>
-              <a:picLocks noChangeAspect="1"/>
-            </p:cNvPicPr>
-            <p:nvPr/>
-          </p:nvPicPr>
-          <p:blipFill>
-            <a:blip r:embed="rId3">
-              <a:extLst>
-                <a:ext uri="{28A0092B-C50C-407E-A947-70E740481C1C}">
-                  <a14:useLocalDpi xmlns:a14="http://schemas.microsoft.com/office/drawing/2010/main" val="0"/>
-                </a:ext>
-              </a:extLst>
-            </a:blip>
-            <a:stretch>
-              <a:fillRect/>
-            </a:stretch>
-          </p:blipFill>
-          <p:spPr>
-            <a:xfrm>
-              <a:off x="182380" y="1836506"/>
-              <a:ext cx="1876425" cy="380928"/>
-            </a:xfrm>
-            <a:prstGeom prst="rect">
-              <a:avLst/>
-            </a:prstGeom>
-          </p:spPr>
-        </p:pic>
-      </p:grpSp>
-      <p:pic>
-        <p:nvPicPr>
-          <p:cNvPr id="8" name="Picture 7">
-            <a:extLst>
-              <a:ext uri="{FF2B5EF4-FFF2-40B4-BE49-F238E27FC236}">
-                <a16:creationId xmlns:a16="http://schemas.microsoft.com/office/drawing/2014/main" id="{05371E2D-28D1-E759-4374-D7BE09068B90}"/>
-              </a:ext>
-            </a:extLst>
-          </p:cNvPr>
-          <p:cNvPicPr>
-            <a:picLocks noChangeAspect="1"/>
-          </p:cNvPicPr>
-          <p:nvPr/>
-        </p:nvPicPr>
-        <p:blipFill>
-          <a:blip r:embed="rId4"/>
-          <a:stretch>
-            <a:fillRect/>
-          </a:stretch>
-        </p:blipFill>
-        <p:spPr>
-          <a:xfrm>
-            <a:off x="910332" y="4144302"/>
-            <a:ext cx="4953926" cy="3124200"/>
-          </a:xfrm>
-          <a:prstGeom prst="rect">
-            <a:avLst/>
-          </a:prstGeom>
-          <a:ln>
-            <a:noFill/>
-          </a:ln>
-          <a:effectLst>
-            <a:outerShdw blurRad="292100" dist="139700" dir="2700000" algn="tl" rotWithShape="0">
-              <a:srgbClr val="333333">
-                <a:alpha val="65000"/>
-              </a:srgbClr>
-            </a:outerShdw>
-          </a:effectLst>
-        </p:spPr>
-      </p:pic>
-      <p:pic>
-        <p:nvPicPr>
-          <p:cNvPr id="10" name="Picture 9">
-            <a:extLst>
-              <a:ext uri="{FF2B5EF4-FFF2-40B4-BE49-F238E27FC236}">
-                <a16:creationId xmlns:a16="http://schemas.microsoft.com/office/drawing/2014/main" id="{9BBCCBDE-F1D5-2B33-010E-8E0C16BDBCA9}"/>
-              </a:ext>
-            </a:extLst>
-          </p:cNvPr>
-          <p:cNvPicPr>
-            <a:picLocks noChangeAspect="1"/>
-          </p:cNvPicPr>
-          <p:nvPr/>
-        </p:nvPicPr>
-        <p:blipFill>
-          <a:blip r:embed="rId5"/>
-          <a:stretch>
-            <a:fillRect/>
-          </a:stretch>
-        </p:blipFill>
-        <p:spPr>
-          <a:xfrm>
-            <a:off x="5486400" y="3635968"/>
-            <a:ext cx="5486400" cy="3209168"/>
-          </a:xfrm>
-          <a:prstGeom prst="rect">
-            <a:avLst/>
-          </a:prstGeom>
-          <a:ln>
-            <a:noFill/>
-          </a:ln>
-          <a:effectLst>
-            <a:outerShdw blurRad="292100" dist="139700" dir="2700000" algn="tl" rotWithShape="0">
-              <a:srgbClr val="333333">
-                <a:alpha val="65000"/>
-              </a:srgbClr>
-            </a:outerShdw>
-          </a:effectLst>
-        </p:spPr>
-      </p:pic>
-      <p:pic>
-        <p:nvPicPr>
-          <p:cNvPr id="12" name="Picture 11">
-            <a:extLst>
-              <a:ext uri="{FF2B5EF4-FFF2-40B4-BE49-F238E27FC236}">
-                <a16:creationId xmlns:a16="http://schemas.microsoft.com/office/drawing/2014/main" id="{5B9EA946-01BE-D20F-7049-5201F4758969}"/>
-              </a:ext>
-            </a:extLst>
-          </p:cNvPr>
-          <p:cNvPicPr>
-            <a:picLocks noChangeAspect="1"/>
-          </p:cNvPicPr>
-          <p:nvPr/>
-        </p:nvPicPr>
-        <p:blipFill>
-          <a:blip r:embed="rId6"/>
-          <a:stretch>
-            <a:fillRect/>
-          </a:stretch>
-        </p:blipFill>
-        <p:spPr>
-          <a:xfrm>
-            <a:off x="6472932" y="4785307"/>
-            <a:ext cx="5638800" cy="2681713"/>
-          </a:xfrm>
-          <a:prstGeom prst="rect">
-            <a:avLst/>
-          </a:prstGeom>
-          <a:ln>
-            <a:noFill/>
-          </a:ln>
-          <a:effectLst>
-            <a:outerShdw blurRad="292100" dist="139700" dir="2700000" algn="tl" rotWithShape="0">
-              <a:srgbClr val="333333">
-                <a:alpha val="65000"/>
-              </a:srgbClr>
-            </a:outerShdw>
-          </a:effectLst>
-        </p:spPr>
-      </p:pic>
-      <p:sp>
-        <p:nvSpPr>
-          <p:cNvPr id="13" name="Slide Number Placeholder 12">
-            <a:extLst>
-              <a:ext uri="{FF2B5EF4-FFF2-40B4-BE49-F238E27FC236}">
-                <a16:creationId xmlns:a16="http://schemas.microsoft.com/office/drawing/2014/main" id="{CAEA88F5-4F2D-231B-EFD7-E78B10F6ED4F}"/>
-              </a:ext>
-            </a:extLst>
-          </p:cNvPr>
-          <p:cNvSpPr>
-            <a:spLocks noGrp="1"/>
-          </p:cNvSpPr>
-          <p:nvPr>
-            <p:ph type="sldNum" sz="quarter" idx="4"/>
-          </p:nvPr>
-        </p:nvSpPr>
-        <p:spPr/>
-        <p:txBody>
-          <a:bodyPr/>
-          <a:lstStyle/>
-          <a:p>
-            <a:fld id="{444583ED-F364-40B3-B25B-483B5033DFA3}" type="slidenum">
-              <a:rPr lang="en-US" smtClean="0"/>
-              <a:pPr/>
-              <a:t>9</a:t>
-            </a:fld>
-            <a:endParaRPr lang="en-US"/>
-          </a:p>
-        </p:txBody>
-      </p:sp>
-    </p:spTree>
-    <p:extLst>
-      <p:ext uri="{BB962C8B-B14F-4D97-AF65-F5344CB8AC3E}">
-        <p14:creationId xmlns:p14="http://schemas.microsoft.com/office/powerpoint/2010/main" val="2503642623"/>
-      </p:ext>
-    </p:extLst>
-  </p:cSld>
-  <p:clrMapOvr>
-    <a:masterClrMapping/>
-  </p:clrMapOvr>
-  <p:timing>
-    <p:tnLst>
-      <p:par>
-        <p:cTn id="1" dur="indefinite" restart="never" nodeType="tmRoot">
-          <p:childTnLst>
-            <p:seq concurrent="1" nextAc="seek">
-              <p:cTn id="2" dur="indefinite" nodeType="mainSeq">
-                <p:childTnLst>
-                  <p:par>
-                    <p:cTn id="3" fill="hold">
-                      <p:stCondLst>
-                        <p:cond delay="indefinite"/>
-                      </p:stCondLst>
-                      <p:childTnLst>
-                        <p:par>
-                          <p:cTn id="4" fill="hold">
-                            <p:stCondLst>
-                              <p:cond delay="0"/>
-                            </p:stCondLst>
-                            <p:childTnLst>
-                              <p:par>
-                                <p:cTn id="5" presetID="1" presetClass="entr" presetSubtype="0" fill="hold" nodeType="clickEffect">
-                                  <p:stCondLst>
-                                    <p:cond delay="0"/>
-                                  </p:stCondLst>
-                                  <p:childTnLst>
-                                    <p:set>
-                                      <p:cBhvr>
-                                        <p:cTn id="6" dur="1" fill="hold">
-                                          <p:stCondLst>
-                                            <p:cond delay="0"/>
-                                          </p:stCondLst>
-                                        </p:cTn>
-                                        <p:tgtEl>
-                                          <p:spTgt spid="4"/>
-                                        </p:tgtEl>
-                                        <p:attrNameLst>
-                                          <p:attrName>style.visibility</p:attrName>
-                                        </p:attrNameLst>
-                                      </p:cBhvr>
-                                      <p:to>
-                                        <p:strVal val="visible"/>
-                                      </p:to>
-                                    </p:set>
-                                  </p:childTnLst>
-                                </p:cTn>
-                              </p:par>
-                            </p:childTnLst>
-                          </p:cTn>
-                        </p:par>
-                      </p:childTnLst>
-                    </p:cTn>
-                  </p:par>
-                  <p:par>
-                    <p:cTn id="7" fill="hold">
-                      <p:stCondLst>
-                        <p:cond delay="indefinite"/>
-                      </p:stCondLst>
-                      <p:childTnLst>
-                        <p:par>
-                          <p:cTn id="8" fill="hold">
-                            <p:stCondLst>
-                              <p:cond delay="0"/>
-                            </p:stCondLst>
-                            <p:childTnLst>
-                              <p:par>
-                                <p:cTn id="9" presetID="1" presetClass="entr" presetSubtype="0" fill="hold" nodeType="clickEffect">
-                                  <p:stCondLst>
-                                    <p:cond delay="0"/>
-                                  </p:stCondLst>
-                                  <p:childTnLst>
-                                    <p:set>
-                                      <p:cBhvr>
-                                        <p:cTn id="10" dur="1" fill="hold">
-                                          <p:stCondLst>
-                                            <p:cond delay="0"/>
-                                          </p:stCondLst>
-                                        </p:cTn>
-                                        <p:tgtEl>
-                                          <p:spTgt spid="8"/>
-                                        </p:tgtEl>
-                                        <p:attrNameLst>
-                                          <p:attrName>style.visibility</p:attrName>
-                                        </p:attrNameLst>
-                                      </p:cBhvr>
-                                      <p:to>
-                                        <p:strVal val="visible"/>
-                                      </p:to>
-                                    </p:set>
-                                  </p:childTnLst>
-                                </p:cTn>
-                              </p:par>
-                            </p:childTnLst>
-                          </p:cTn>
-                        </p:par>
-                      </p:childTnLst>
-                    </p:cTn>
-                  </p:par>
-                  <p:par>
-                    <p:cTn id="11" fill="hold">
-                      <p:stCondLst>
-                        <p:cond delay="indefinite"/>
-                      </p:stCondLst>
-                      <p:childTnLst>
-                        <p:par>
-                          <p:cTn id="12" fill="hold">
-                            <p:stCondLst>
-                              <p:cond delay="0"/>
-                            </p:stCondLst>
-                            <p:childTnLst>
-                              <p:par>
-                                <p:cTn id="13" presetID="1" presetClass="entr" presetSubtype="0" fill="hold" nodeType="clickEffect">
-                                  <p:stCondLst>
-                                    <p:cond delay="0"/>
-                                  </p:stCondLst>
-                                  <p:childTnLst>
-                                    <p:set>
-                                      <p:cBhvr>
-                                        <p:cTn id="14" dur="1" fill="hold">
-                                          <p:stCondLst>
-                                            <p:cond delay="0"/>
-                                          </p:stCondLst>
-                                        </p:cTn>
-                                        <p:tgtEl>
-                                          <p:spTgt spid="10"/>
-                                        </p:tgtEl>
-                                        <p:attrNameLst>
-                                          <p:attrName>style.visibility</p:attrName>
-                                        </p:attrNameLst>
-                                      </p:cBhvr>
-                                      <p:to>
-                                        <p:strVal val="visible"/>
-                                      </p:to>
-                                    </p:set>
-                                  </p:childTnLst>
-                                </p:cTn>
-                              </p:par>
-                            </p:childTnLst>
-                          </p:cTn>
-                        </p:par>
-                      </p:childTnLst>
-                    </p:cTn>
-                  </p:par>
-                  <p:par>
-                    <p:cTn id="15" fill="hold">
-                      <p:stCondLst>
-                        <p:cond delay="indefinite"/>
-                      </p:stCondLst>
-                      <p:childTnLst>
-                        <p:par>
-                          <p:cTn id="16" fill="hold">
-                            <p:stCondLst>
-                              <p:cond delay="0"/>
-                            </p:stCondLst>
-                            <p:childTnLst>
-                              <p:par>
-                                <p:cTn id="17" presetID="1" presetClass="entr" presetSubtype="0" fill="hold" nodeType="clickEffect">
-                                  <p:stCondLst>
-                                    <p:cond delay="0"/>
-                                  </p:stCondLst>
-                                  <p:childTnLst>
-                                    <p:set>
-                                      <p:cBhvr>
-                                        <p:cTn id="18" dur="1" fill="hold">
-                                          <p:stCondLst>
-                                            <p:cond delay="0"/>
-                                          </p:stCondLst>
-                                        </p:cTn>
-                                        <p:tgtEl>
-                                          <p:spTgt spid="12"/>
-                                        </p:tgtEl>
-                                        <p:attrNameLst>
-                                          <p:attrName>style.visibility</p:attrName>
-                                        </p:attrNameLst>
-                                      </p:cBhvr>
-                                      <p:to>
-                                        <p:strVal val="visible"/>
-                                      </p:to>
-                                    </p:set>
-                                  </p:childTnLst>
-                                </p:cTn>
-                              </p:par>
-                            </p:childTnLst>
-                          </p:cTn>
-                        </p:par>
-                      </p:childTnLst>
-                    </p:cTn>
-                  </p:par>
-                </p:childTnLst>
-              </p:cTn>
-              <p:prevCondLst>
-                <p:cond evt="onPrev" delay="0">
-                  <p:tgtEl>
-                    <p:sldTgt/>
-                  </p:tgtEl>
-                </p:cond>
-              </p:prevCondLst>
-              <p:nextCondLst>
-                <p:cond evt="onNext" delay="0">
-                  <p:tgtEl>
-                    <p:sldTgt/>
-                  </p:tgtEl>
-                </p:cond>
-              </p:nextCondLst>
-            </p:seq>
-          </p:childTnLst>
-        </p:cTn>
-      </p:par>
-    </p:tnLst>
-  </p:timing>
 </p:sld>
 </file>
 

</xml_diff>